<commit_message>
project presentation : update
</commit_message>
<xml_diff>
--- a/20201202_AndroidFilaire_ProjectRequirements.pptx
+++ b/20201202_AndroidFilaire_ProjectRequirements.pptx
@@ -1393,7 +1393,7 @@
           <a:p>
             <a:fld id="{0E138098-C4A3-4BCA-89EB-E40766D4218F}" type="datetimeFigureOut">
               <a:rPr lang="en-US" smtClean="0"/>
-              <a:t>12/2/2020</a:t>
+              <a:t>12/10/2020</a:t>
             </a:fld>
             <a:endParaRPr lang="en-US"/>
           </a:p>
@@ -9720,7 +9720,7 @@
         <p:spPr/>
         <p:txBody>
           <a:bodyPr>
-            <a:normAutofit lnSpcReduction="10000"/>
+            <a:normAutofit fontScale="92500" lnSpcReduction="10000"/>
           </a:bodyPr>
           <a:lstStyle/>
           <a:p>
@@ -9766,6 +9766,10 @@
           <a:p>
             <a:pPr lvl="1"/>
             <a:r>
+              <a:rPr lang="fr-FR" dirty="0"/>
+              <a:t>Package </a:t>
+            </a:r>
+            <a:r>
               <a:rPr lang="fr-FR" dirty="0" err="1"/>
               <a:t>Usb</a:t>
             </a:r>
@@ -9803,7 +9807,58 @@
             </a:r>
             <a:r>
               <a:rPr lang="fr-FR" dirty="0"/>
-              <a:t>.</a:t>
+              <a:t> (but </a:t>
+            </a:r>
+            <a:r>
+              <a:rPr lang="fr-FR" dirty="0" err="1"/>
+              <a:t>finally</a:t>
+            </a:r>
+            <a:r>
+              <a:rPr lang="fr-FR" dirty="0"/>
+              <a:t> not </a:t>
+            </a:r>
+            <a:r>
+              <a:rPr lang="fr-FR" dirty="0" err="1"/>
+              <a:t>used</a:t>
+            </a:r>
+            <a:r>
+              <a:rPr lang="fr-FR" dirty="0"/>
+              <a:t>).</a:t>
+            </a:r>
+          </a:p>
+          <a:p>
+            <a:pPr lvl="1"/>
+            <a:r>
+              <a:rPr lang="fr-FR" u="sng" dirty="0" err="1"/>
+              <a:t>We</a:t>
+            </a:r>
+            <a:r>
+              <a:rPr lang="fr-FR" u="sng" dirty="0"/>
+              <a:t> </a:t>
+            </a:r>
+            <a:r>
+              <a:rPr lang="fr-FR" u="sng" dirty="0" err="1"/>
+              <a:t>managed</a:t>
+            </a:r>
+            <a:r>
+              <a:rPr lang="fr-FR" u="sng" dirty="0"/>
+              <a:t> to Write/Write to the </a:t>
+            </a:r>
+            <a:r>
+              <a:rPr lang="fr-FR" u="sng" dirty="0" err="1"/>
+              <a:t>device</a:t>
+            </a:r>
+            <a:r>
+              <a:rPr lang="fr-FR" u="sng" dirty="0"/>
+              <a:t> </a:t>
+            </a:r>
+            <a:r>
+              <a:rPr lang="fr-FR" u="sng" dirty="0" err="1"/>
+              <a:t>Using</a:t>
+            </a:r>
+            <a:r>
+              <a:rPr lang="fr-FR" u="sng" dirty="0"/>
+              <a:t> USB Android API</a:t>
             </a:r>
           </a:p>
           <a:p>
@@ -9862,6 +9917,10 @@
           </a:p>
           <a:p>
             <a:r>
+              <a:rPr lang="fr-FR" dirty="0"/>
+              <a:t>Library </a:t>
+            </a:r>
+            <a:r>
               <a:rPr lang="fr-FR" dirty="0" err="1"/>
               <a:t>Wrapper</a:t>
             </a:r>
@@ -9885,7 +9944,31 @@
             </a:r>
             <a:r>
               <a:rPr lang="fr-FR" dirty="0"/>
-              <a:t> : interface </a:t>
+              <a:t> : </a:t>
+            </a:r>
+            <a:r>
+              <a:rPr lang="fr-FR" dirty="0" err="1"/>
+              <a:t>completed</a:t>
+            </a:r>
+            <a:r>
+              <a:rPr lang="fr-FR" dirty="0"/>
+              <a:t>. It </a:t>
+            </a:r>
+            <a:r>
+              <a:rPr lang="fr-FR" dirty="0" err="1"/>
+              <a:t>acts</a:t>
+            </a:r>
+            <a:r>
+              <a:rPr lang="fr-FR" dirty="0"/>
+              <a:t> as a </a:t>
+            </a:r>
+            <a:r>
+              <a:rPr lang="fr-FR" dirty="0" err="1"/>
+              <a:t>device</a:t>
+            </a:r>
+            <a:r>
+              <a:rPr lang="fr-FR" dirty="0"/>
+              <a:t>.</a:t>
             </a:r>
           </a:p>
           <a:p>
@@ -9914,7 +9997,9 @@
               <a:t> on </a:t>
             </a:r>
             <a:r>
-              <a:rPr lang="fr-FR" dirty="0" err="1"/>
+              <a:rPr lang="fr-FR" dirty="0" err="1">
+                <a:hlinkClick r:id="rId2"/>
+              </a:rPr>
               <a:t>Github</a:t>
             </a:r>
             <a:r>
@@ -10203,12 +10288,187 @@
           <a:p>
             <a:pPr lvl="1"/>
             <a:r>
-              <a:rPr lang="fr-FR" dirty="0" err="1"/>
+              <a:rPr lang="fr-FR" dirty="0" err="1">
+                <a:solidFill>
+                  <a:srgbClr val="45F786"/>
+                </a:solidFill>
+              </a:rPr>
               <a:t>Preferred</a:t>
             </a:r>
             <a:r>
-              <a:rPr lang="fr-FR" dirty="0"/>
+              <a:rPr lang="fr-FR" dirty="0">
+                <a:solidFill>
+                  <a:srgbClr val="45F786"/>
+                </a:solidFill>
+              </a:rPr>
               <a:t> </a:t>
+            </a:r>
+            <a:r>
+              <a:rPr lang="fr-FR" dirty="0" err="1">
+                <a:solidFill>
+                  <a:srgbClr val="45F786"/>
+                </a:solidFill>
+              </a:rPr>
+              <a:t>way</a:t>
+            </a:r>
+            <a:r>
+              <a:rPr lang="fr-FR" dirty="0">
+                <a:solidFill>
+                  <a:srgbClr val="45F786"/>
+                </a:solidFill>
+              </a:rPr>
+              <a:t> : </a:t>
+            </a:r>
+            <a:r>
+              <a:rPr lang="fr-FR" dirty="0" err="1">
+                <a:solidFill>
+                  <a:srgbClr val="45F786"/>
+                </a:solidFill>
+              </a:rPr>
+              <a:t>pass</a:t>
+            </a:r>
+            <a:r>
+              <a:rPr lang="fr-FR" dirty="0">
+                <a:solidFill>
+                  <a:srgbClr val="45F786"/>
+                </a:solidFill>
+              </a:rPr>
+              <a:t> the </a:t>
+            </a:r>
+            <a:r>
+              <a:rPr lang="fr-FR" dirty="0" err="1">
+                <a:solidFill>
+                  <a:srgbClr val="45F786"/>
+                </a:solidFill>
+              </a:rPr>
+              <a:t>Fd</a:t>
+            </a:r>
+            <a:r>
+              <a:rPr lang="fr-FR" dirty="0">
+                <a:solidFill>
+                  <a:srgbClr val="45F786"/>
+                </a:solidFill>
+              </a:rPr>
+              <a:t> </a:t>
+            </a:r>
+            <a:r>
+              <a:rPr lang="fr-FR" dirty="0" err="1">
+                <a:solidFill>
+                  <a:srgbClr val="45F786"/>
+                </a:solidFill>
+              </a:rPr>
+              <a:t>descriptor</a:t>
+            </a:r>
+            <a:r>
+              <a:rPr lang="fr-FR" dirty="0">
+                <a:solidFill>
+                  <a:srgbClr val="45F786"/>
+                </a:solidFill>
+              </a:rPr>
+              <a:t> </a:t>
+            </a:r>
+            <a:r>
+              <a:rPr lang="fr-FR" dirty="0" err="1">
+                <a:solidFill>
+                  <a:srgbClr val="45F786"/>
+                </a:solidFill>
+              </a:rPr>
+              <a:t>created</a:t>
+            </a:r>
+            <a:r>
+              <a:rPr lang="fr-FR" dirty="0">
+                <a:solidFill>
+                  <a:srgbClr val="45F786"/>
+                </a:solidFill>
+              </a:rPr>
+              <a:t> in the C# </a:t>
+            </a:r>
+            <a:r>
+              <a:rPr lang="fr-FR" dirty="0" err="1">
+                <a:solidFill>
+                  <a:srgbClr val="45F786"/>
+                </a:solidFill>
+              </a:rPr>
+              <a:t>context</a:t>
+            </a:r>
+            <a:r>
+              <a:rPr lang="fr-FR" dirty="0">
+                <a:solidFill>
+                  <a:srgbClr val="45F786"/>
+                </a:solidFill>
+              </a:rPr>
+              <a:t> to the </a:t>
+            </a:r>
+            <a:r>
+              <a:rPr lang="fr-FR" dirty="0" err="1">
+                <a:solidFill>
+                  <a:srgbClr val="45F786"/>
+                </a:solidFill>
+              </a:rPr>
+              <a:t>library</a:t>
+            </a:r>
+            <a:r>
+              <a:rPr lang="fr-FR" dirty="0">
+                <a:solidFill>
+                  <a:srgbClr val="45F786"/>
+                </a:solidFill>
+              </a:rPr>
+              <a:t> </a:t>
+            </a:r>
+            <a:r>
+              <a:rPr lang="fr-FR" dirty="0" err="1">
+                <a:solidFill>
+                  <a:srgbClr val="45F786"/>
+                </a:solidFill>
+              </a:rPr>
+              <a:t>that</a:t>
+            </a:r>
+            <a:r>
+              <a:rPr lang="fr-FR" dirty="0">
+                <a:solidFill>
+                  <a:srgbClr val="45F786"/>
+                </a:solidFill>
+              </a:rPr>
+              <a:t> </a:t>
+            </a:r>
+            <a:r>
+              <a:rPr lang="fr-FR" dirty="0" err="1">
+                <a:solidFill>
+                  <a:srgbClr val="45F786"/>
+                </a:solidFill>
+              </a:rPr>
+              <a:t>does</a:t>
+            </a:r>
+            <a:r>
+              <a:rPr lang="fr-FR" dirty="0">
+                <a:solidFill>
+                  <a:srgbClr val="45F786"/>
+                </a:solidFill>
+              </a:rPr>
+              <a:t> all the job (</a:t>
+            </a:r>
+            <a:r>
+              <a:rPr lang="fr-FR" dirty="0" err="1">
+                <a:solidFill>
+                  <a:srgbClr val="45F786"/>
+                </a:solidFill>
+              </a:rPr>
+              <a:t>search</a:t>
+            </a:r>
+            <a:r>
+              <a:rPr lang="fr-FR" dirty="0">
+                <a:solidFill>
+                  <a:srgbClr val="45F786"/>
+                </a:solidFill>
+              </a:rPr>
+              <a:t> for the FIXME in the code).</a:t>
+            </a:r>
+          </a:p>
+          <a:p>
+            <a:pPr lvl="1"/>
+            <a:r>
+              <a:rPr lang="fr-FR" dirty="0"/>
+              <a:t>Accepted </a:t>
             </a:r>
             <a:r>
               <a:rPr lang="fr-FR" dirty="0" err="1"/>
@@ -10220,31 +10480,23 @@
             </a:r>
             <a:r>
               <a:rPr lang="fr-FR" dirty="0" err="1"/>
-              <a:t>pass</a:t>
-            </a:r>
-            <a:r>
-              <a:rPr lang="fr-FR" dirty="0"/>
-              <a:t> the </a:t>
+              <a:t>implement</a:t>
+            </a:r>
+            <a:r>
+              <a:rPr lang="fr-FR" dirty="0"/>
+              <a:t> </a:t>
             </a:r>
             <a:r>
               <a:rPr lang="fr-FR" dirty="0" err="1"/>
-              <a:t>Fd</a:t>
-            </a:r>
-            <a:r>
-              <a:rPr lang="fr-FR" dirty="0"/>
-              <a:t> </a:t>
+              <a:t>device’s</a:t>
+            </a:r>
+            <a:r>
+              <a:rPr lang="fr-FR" dirty="0"/>
+              <a:t> R/W </a:t>
             </a:r>
             <a:r>
               <a:rPr lang="fr-FR" dirty="0" err="1"/>
-              <a:t>descriptor</a:t>
-            </a:r>
-            <a:r>
-              <a:rPr lang="fr-FR" dirty="0"/>
-              <a:t> </a:t>
-            </a:r>
-            <a:r>
-              <a:rPr lang="fr-FR" dirty="0" err="1"/>
-              <a:t>created</a:t>
+              <a:t>access</a:t>
             </a:r>
             <a:r>
               <a:rPr lang="fr-FR" dirty="0"/>
@@ -10256,7 +10508,7 @@
             </a:r>
             <a:r>
               <a:rPr lang="fr-FR" dirty="0"/>
-              <a:t> to the </a:t>
+              <a:t>, use </a:t>
             </a:r>
             <a:r>
               <a:rPr lang="fr-FR" dirty="0" err="1"/>
@@ -10264,101 +10516,6 @@
             </a:r>
             <a:r>
               <a:rPr lang="fr-FR" dirty="0"/>
-              <a:t> </a:t>
-            </a:r>
-            <a:r>
-              <a:rPr lang="fr-FR" dirty="0" err="1"/>
-              <a:t>that</a:t>
-            </a:r>
-            <a:r>
-              <a:rPr lang="fr-FR" dirty="0"/>
-              <a:t> </a:t>
-            </a:r>
-            <a:r>
-              <a:rPr lang="fr-FR" dirty="0" err="1"/>
-              <a:t>does</a:t>
-            </a:r>
-            <a:r>
-              <a:rPr lang="fr-FR" dirty="0"/>
-              <a:t> all the job (</a:t>
-            </a:r>
-            <a:r>
-              <a:rPr lang="fr-FR" dirty="0" err="1"/>
-              <a:t>you</a:t>
-            </a:r>
-            <a:r>
-              <a:rPr lang="fr-FR" dirty="0"/>
-              <a:t> </a:t>
-            </a:r>
-            <a:r>
-              <a:rPr lang="fr-FR" dirty="0" err="1"/>
-              <a:t>debug</a:t>
-            </a:r>
-            <a:r>
-              <a:rPr lang="fr-FR" dirty="0"/>
-              <a:t> the </a:t>
-            </a:r>
-            <a:r>
-              <a:rPr lang="fr-FR" dirty="0" err="1"/>
-              <a:t>stuf</a:t>
-            </a:r>
-            <a:r>
-              <a:rPr lang="fr-FR" dirty="0"/>
-              <a:t>).</a:t>
-            </a:r>
-          </a:p>
-          <a:p>
-            <a:pPr lvl="1"/>
-            <a:r>
-              <a:rPr lang="fr-FR" dirty="0"/>
-              <a:t>Accepted </a:t>
-            </a:r>
-            <a:r>
-              <a:rPr lang="fr-FR" dirty="0" err="1"/>
-              <a:t>way</a:t>
-            </a:r>
-            <a:r>
-              <a:rPr lang="fr-FR" dirty="0"/>
-              <a:t> : </a:t>
-            </a:r>
-            <a:r>
-              <a:rPr lang="fr-FR" dirty="0" err="1"/>
-              <a:t>implement</a:t>
-            </a:r>
-            <a:r>
-              <a:rPr lang="fr-FR" dirty="0"/>
-              <a:t> </a:t>
-            </a:r>
-            <a:r>
-              <a:rPr lang="fr-FR" dirty="0" err="1"/>
-              <a:t>device’s</a:t>
-            </a:r>
-            <a:r>
-              <a:rPr lang="fr-FR" dirty="0"/>
-              <a:t> R/W </a:t>
-            </a:r>
-            <a:r>
-              <a:rPr lang="fr-FR" dirty="0" err="1"/>
-              <a:t>access</a:t>
-            </a:r>
-            <a:r>
-              <a:rPr lang="fr-FR" dirty="0"/>
-              <a:t> in the C# </a:t>
-            </a:r>
-            <a:r>
-              <a:rPr lang="fr-FR" dirty="0" err="1"/>
-              <a:t>context</a:t>
-            </a:r>
-            <a:r>
-              <a:rPr lang="fr-FR" dirty="0"/>
-              <a:t>, use </a:t>
-            </a:r>
-            <a:r>
-              <a:rPr lang="fr-FR" dirty="0" err="1"/>
-              <a:t>library</a:t>
-            </a:r>
-            <a:r>
-              <a:rPr lang="fr-FR" dirty="0"/>
               <a:t> calls for frame </a:t>
             </a:r>
             <a:r>
@@ -10375,49 +10532,210 @@
             </a:r>
             <a:r>
               <a:rPr lang="fr-FR" dirty="0"/>
-              <a:t> code).</a:t>
-            </a:r>
+              <a:t> code) </a:t>
+            </a:r>
+            <a:r>
+              <a:rPr lang="fr-FR" dirty="0">
+                <a:sym typeface="Wingdings" panose="05000000000000000000" pitchFamily="2" charset="2"/>
+              </a:rPr>
+              <a:t> </a:t>
+            </a:r>
+            <a:r>
+              <a:rPr lang="fr-FR" u="sng" dirty="0" err="1">
+                <a:sym typeface="Wingdings" panose="05000000000000000000" pitchFamily="2" charset="2"/>
+              </a:rPr>
+              <a:t>We</a:t>
+            </a:r>
+            <a:r>
+              <a:rPr lang="fr-FR" u="sng" dirty="0">
+                <a:sym typeface="Wingdings" panose="05000000000000000000" pitchFamily="2" charset="2"/>
+              </a:rPr>
+              <a:t> </a:t>
+            </a:r>
+            <a:r>
+              <a:rPr lang="fr-FR" u="sng" dirty="0" err="1">
+                <a:sym typeface="Wingdings" panose="05000000000000000000" pitchFamily="2" charset="2"/>
+              </a:rPr>
+              <a:t>done</a:t>
+            </a:r>
+            <a:r>
+              <a:rPr lang="fr-FR" u="sng" dirty="0">
+                <a:sym typeface="Wingdings" panose="05000000000000000000" pitchFamily="2" charset="2"/>
+              </a:rPr>
+              <a:t> </a:t>
+            </a:r>
+            <a:r>
+              <a:rPr lang="fr-FR" u="sng" dirty="0" err="1">
+                <a:sym typeface="Wingdings" panose="05000000000000000000" pitchFamily="2" charset="2"/>
+              </a:rPr>
+              <a:t>this</a:t>
+            </a:r>
+            <a:r>
+              <a:rPr lang="fr-FR" u="sng" dirty="0">
+                <a:sym typeface="Wingdings" panose="05000000000000000000" pitchFamily="2" charset="2"/>
+              </a:rPr>
+              <a:t> </a:t>
+            </a:r>
+            <a:r>
+              <a:rPr lang="fr-FR" u="sng" dirty="0" err="1">
+                <a:sym typeface="Wingdings" panose="05000000000000000000" pitchFamily="2" charset="2"/>
+              </a:rPr>
+              <a:t>work</a:t>
+            </a:r>
+            <a:r>
+              <a:rPr lang="fr-FR" u="sng">
+                <a:sym typeface="Wingdings" panose="05000000000000000000" pitchFamily="2" charset="2"/>
+              </a:rPr>
+              <a:t> and </a:t>
+            </a:r>
+            <a:r>
+              <a:rPr lang="fr-FR" u="sng" dirty="0" err="1">
+                <a:sym typeface="Wingdings" panose="05000000000000000000" pitchFamily="2" charset="2"/>
+              </a:rPr>
+              <a:t>its</a:t>
+            </a:r>
+            <a:r>
+              <a:rPr lang="fr-FR" u="sng" dirty="0">
+                <a:sym typeface="Wingdings" panose="05000000000000000000" pitchFamily="2" charset="2"/>
+              </a:rPr>
+              <a:t> </a:t>
+            </a:r>
+            <a:r>
+              <a:rPr lang="fr-FR" u="sng" dirty="0" err="1">
+                <a:sym typeface="Wingdings" panose="05000000000000000000" pitchFamily="2" charset="2"/>
+              </a:rPr>
+              <a:t>working</a:t>
+            </a:r>
+            <a:r>
+              <a:rPr lang="fr-FR" u="sng" dirty="0">
+                <a:sym typeface="Wingdings" panose="05000000000000000000" pitchFamily="2" charset="2"/>
+              </a:rPr>
+              <a:t>, </a:t>
+            </a:r>
+            <a:r>
+              <a:rPr lang="fr-FR" u="sng" dirty="0" err="1">
+                <a:sym typeface="Wingdings" panose="05000000000000000000" pitchFamily="2" charset="2"/>
+              </a:rPr>
+              <a:t>so</a:t>
+            </a:r>
+            <a:r>
+              <a:rPr lang="fr-FR" u="sng" dirty="0">
+                <a:sym typeface="Wingdings" panose="05000000000000000000" pitchFamily="2" charset="2"/>
+              </a:rPr>
+              <a:t> no </a:t>
+            </a:r>
+            <a:r>
+              <a:rPr lang="fr-FR" u="sng" dirty="0" err="1">
+                <a:sym typeface="Wingdings" panose="05000000000000000000" pitchFamily="2" charset="2"/>
+              </a:rPr>
+              <a:t>need</a:t>
+            </a:r>
+            <a:r>
+              <a:rPr lang="fr-FR" u="sng" dirty="0">
+                <a:sym typeface="Wingdings" panose="05000000000000000000" pitchFamily="2" charset="2"/>
+              </a:rPr>
+              <a:t> for </a:t>
+            </a:r>
+            <a:r>
+              <a:rPr lang="fr-FR" u="sng" dirty="0" err="1">
+                <a:sym typeface="Wingdings" panose="05000000000000000000" pitchFamily="2" charset="2"/>
+              </a:rPr>
+              <a:t>you</a:t>
+            </a:r>
+            <a:r>
+              <a:rPr lang="fr-FR" u="sng" dirty="0">
+                <a:sym typeface="Wingdings" panose="05000000000000000000" pitchFamily="2" charset="2"/>
+              </a:rPr>
+              <a:t> help</a:t>
+            </a:r>
+            <a:r>
+              <a:rPr lang="fr-FR" dirty="0">
+                <a:sym typeface="Wingdings" panose="05000000000000000000" pitchFamily="2" charset="2"/>
+              </a:rPr>
+              <a:t>.</a:t>
+            </a:r>
+            <a:endParaRPr lang="fr-FR" dirty="0"/>
           </a:p>
           <a:p>
             <a:pPr lvl="1"/>
             <a:r>
-              <a:rPr lang="fr-FR" dirty="0" err="1"/>
+              <a:rPr lang="fr-FR" dirty="0" err="1">
+                <a:solidFill>
+                  <a:srgbClr val="FF0000"/>
+                </a:solidFill>
+              </a:rPr>
               <a:t>Refused</a:t>
             </a:r>
             <a:r>
-              <a:rPr lang="fr-FR" dirty="0"/>
+              <a:rPr lang="fr-FR" dirty="0">
+                <a:solidFill>
+                  <a:srgbClr val="FF0000"/>
+                </a:solidFill>
+              </a:rPr>
               <a:t> </a:t>
             </a:r>
             <a:r>
-              <a:rPr lang="fr-FR" dirty="0" err="1"/>
+              <a:rPr lang="fr-FR" dirty="0" err="1">
+                <a:solidFill>
+                  <a:srgbClr val="FF0000"/>
+                </a:solidFill>
+              </a:rPr>
               <a:t>way</a:t>
             </a:r>
             <a:r>
-              <a:rPr lang="fr-FR" dirty="0"/>
+              <a:rPr lang="fr-FR" dirty="0">
+                <a:solidFill>
+                  <a:srgbClr val="FF0000"/>
+                </a:solidFill>
+              </a:rPr>
               <a:t> : bypass </a:t>
             </a:r>
             <a:r>
-              <a:rPr lang="fr-FR" dirty="0" err="1"/>
+              <a:rPr lang="fr-FR" dirty="0" err="1">
+                <a:solidFill>
+                  <a:srgbClr val="FF0000"/>
+                </a:solidFill>
+              </a:rPr>
               <a:t>library</a:t>
             </a:r>
             <a:r>
-              <a:rPr lang="fr-FR" dirty="0"/>
+              <a:rPr lang="fr-FR" dirty="0">
+                <a:solidFill>
+                  <a:srgbClr val="FF0000"/>
+                </a:solidFill>
+              </a:rPr>
               <a:t> and </a:t>
             </a:r>
             <a:r>
-              <a:rPr lang="fr-FR" dirty="0" err="1"/>
+              <a:rPr lang="fr-FR" dirty="0" err="1">
+                <a:solidFill>
+                  <a:srgbClr val="FF0000"/>
+                </a:solidFill>
+              </a:rPr>
               <a:t>totally</a:t>
             </a:r>
             <a:r>
-              <a:rPr lang="fr-FR" dirty="0"/>
+              <a:rPr lang="fr-FR" dirty="0">
+                <a:solidFill>
+                  <a:srgbClr val="FF0000"/>
+                </a:solidFill>
+              </a:rPr>
               <a:t> rewrite </a:t>
             </a:r>
             <a:r>
-              <a:rPr lang="fr-FR" dirty="0" err="1"/>
+              <a:rPr lang="fr-FR" dirty="0" err="1">
+                <a:solidFill>
+                  <a:srgbClr val="FF0000"/>
+                </a:solidFill>
+              </a:rPr>
               <a:t>protocol</a:t>
             </a:r>
             <a:r>
-              <a:rPr lang="fr-FR" dirty="0"/>
+              <a:rPr lang="fr-FR" dirty="0">
+                <a:solidFill>
+                  <a:srgbClr val="FF0000"/>
+                </a:solidFill>
+              </a:rPr>
               <a:t> in C#</a:t>
             </a:r>
           </a:p>
@@ -13418,7 +13736,7 @@
               </a:ln>
               <a:extLst>
                 <a:ext uri="{C572A759-6A51-4108-AA02-DFA0A04FC94B}">
-                  <ma14:wrappingTextBoxFlag xmlns:ma14="http://schemas.microsoft.com/office/mac/drawingml/2011/main" xmlns="" val="1"/>
+                  <ma14:wrappingTextBoxFlag xmlns="" xmlns:ma14="http://schemas.microsoft.com/office/mac/drawingml/2011/main" val="1"/>
                 </a:ext>
               </a:extLst>
             </p:spPr>
@@ -13530,7 +13848,7 @@
               </a:ln>
               <a:extLst>
                 <a:ext uri="{C572A759-6A51-4108-AA02-DFA0A04FC94B}">
-                  <ma14:wrappingTextBoxFlag xmlns:ma14="http://schemas.microsoft.com/office/mac/drawingml/2011/main" xmlns="" val="1"/>
+                  <ma14:wrappingTextBoxFlag xmlns="" xmlns:ma14="http://schemas.microsoft.com/office/mac/drawingml/2011/main" val="1"/>
                 </a:ext>
               </a:extLst>
             </p:spPr>
@@ -13642,7 +13960,7 @@
               </a:ln>
               <a:extLst>
                 <a:ext uri="{C572A759-6A51-4108-AA02-DFA0A04FC94B}">
-                  <ma14:wrappingTextBoxFlag xmlns:ma14="http://schemas.microsoft.com/office/mac/drawingml/2011/main" xmlns="" val="1"/>
+                  <ma14:wrappingTextBoxFlag xmlns="" xmlns:ma14="http://schemas.microsoft.com/office/mac/drawingml/2011/main" val="1"/>
                 </a:ext>
               </a:extLst>
             </p:spPr>
@@ -13754,7 +14072,7 @@
               </a:ln>
               <a:extLst>
                 <a:ext uri="{C572A759-6A51-4108-AA02-DFA0A04FC94B}">
-                  <ma14:wrappingTextBoxFlag xmlns:ma14="http://schemas.microsoft.com/office/mac/drawingml/2011/main" xmlns="" val="1"/>
+                  <ma14:wrappingTextBoxFlag xmlns="" xmlns:ma14="http://schemas.microsoft.com/office/mac/drawingml/2011/main" val="1"/>
                 </a:ext>
               </a:extLst>
             </p:spPr>
@@ -13866,7 +14184,7 @@
               </a:ln>
               <a:extLst>
                 <a:ext uri="{C572A759-6A51-4108-AA02-DFA0A04FC94B}">
-                  <ma14:wrappingTextBoxFlag xmlns:ma14="http://schemas.microsoft.com/office/mac/drawingml/2011/main" xmlns="" val="1"/>
+                  <ma14:wrappingTextBoxFlag xmlns="" xmlns:ma14="http://schemas.microsoft.com/office/mac/drawingml/2011/main" val="1"/>
                 </a:ext>
               </a:extLst>
             </p:spPr>
@@ -13978,7 +14296,7 @@
               </a:ln>
               <a:extLst>
                 <a:ext uri="{C572A759-6A51-4108-AA02-DFA0A04FC94B}">
-                  <ma14:wrappingTextBoxFlag xmlns:ma14="http://schemas.microsoft.com/office/mac/drawingml/2011/main" xmlns="" val="1"/>
+                  <ma14:wrappingTextBoxFlag xmlns="" xmlns:ma14="http://schemas.microsoft.com/office/mac/drawingml/2011/main" val="1"/>
                 </a:ext>
               </a:extLst>
             </p:spPr>
@@ -14096,7 +14414,7 @@
               </a:ln>
               <a:extLst>
                 <a:ext uri="{C572A759-6A51-4108-AA02-DFA0A04FC94B}">
-                  <ma14:wrappingTextBoxFlag xmlns:ma14="http://schemas.microsoft.com/office/mac/drawingml/2011/main" xmlns="" val="1"/>
+                  <ma14:wrappingTextBoxFlag xmlns="" xmlns:ma14="http://schemas.microsoft.com/office/mac/drawingml/2011/main" val="1"/>
                 </a:ext>
               </a:extLst>
             </p:spPr>
@@ -14243,7 +14561,7 @@
               </a:ln>
               <a:extLst>
                 <a:ext uri="{C572A759-6A51-4108-AA02-DFA0A04FC94B}">
-                  <ma14:wrappingTextBoxFlag xmlns:ma14="http://schemas.microsoft.com/office/mac/drawingml/2011/main" xmlns="" val="1"/>
+                  <ma14:wrappingTextBoxFlag xmlns="" xmlns:ma14="http://schemas.microsoft.com/office/mac/drawingml/2011/main" val="1"/>
                 </a:ext>
               </a:extLst>
             </p:spPr>
@@ -14381,7 +14699,7 @@
               </a:ln>
               <a:extLst>
                 <a:ext uri="{C572A759-6A51-4108-AA02-DFA0A04FC94B}">
-                  <ma14:wrappingTextBoxFlag xmlns:ma14="http://schemas.microsoft.com/office/mac/drawingml/2011/main" xmlns="" val="1"/>
+                  <ma14:wrappingTextBoxFlag xmlns="" xmlns:ma14="http://schemas.microsoft.com/office/mac/drawingml/2011/main" val="1"/>
                 </a:ext>
               </a:extLst>
             </p:spPr>
@@ -14502,7 +14820,7 @@
               </a:ln>
               <a:extLst>
                 <a:ext uri="{C572A759-6A51-4108-AA02-DFA0A04FC94B}">
-                  <ma14:wrappingTextBoxFlag xmlns:ma14="http://schemas.microsoft.com/office/mac/drawingml/2011/main" xmlns="" val="1"/>
+                  <ma14:wrappingTextBoxFlag xmlns="" xmlns:ma14="http://schemas.microsoft.com/office/mac/drawingml/2011/main" val="1"/>
                 </a:ext>
               </a:extLst>
             </p:spPr>
@@ -14650,7 +14968,7 @@
             </a:ln>
             <a:extLst>
               <a:ext uri="{C572A759-6A51-4108-AA02-DFA0A04FC94B}">
-                <ma14:wrappingTextBoxFlag xmlns:ma14="http://schemas.microsoft.com/office/mac/drawingml/2011/main" xmlns="" val="1"/>
+                <ma14:wrappingTextBoxFlag xmlns="" xmlns:ma14="http://schemas.microsoft.com/office/mac/drawingml/2011/main" val="1"/>
               </a:ext>
             </a:extLst>
           </p:spPr>
@@ -14762,7 +15080,7 @@
             </a:ln>
             <a:extLst>
               <a:ext uri="{C572A759-6A51-4108-AA02-DFA0A04FC94B}">
-                <ma14:wrappingTextBoxFlag xmlns:ma14="http://schemas.microsoft.com/office/mac/drawingml/2011/main" xmlns="" val="1"/>
+                <ma14:wrappingTextBoxFlag xmlns="" xmlns:ma14="http://schemas.microsoft.com/office/mac/drawingml/2011/main" val="1"/>
               </a:ext>
             </a:extLst>
           </p:spPr>
@@ -15380,7 +15698,7 @@
             </a:ln>
             <a:extLst>
               <a:ext uri="{C572A759-6A51-4108-AA02-DFA0A04FC94B}">
-                <ma14:wrappingTextBoxFlag xmlns:ma14="http://schemas.microsoft.com/office/mac/drawingml/2011/main" xmlns="" val="1"/>
+                <ma14:wrappingTextBoxFlag xmlns="" xmlns:ma14="http://schemas.microsoft.com/office/mac/drawingml/2011/main" val="1"/>
               </a:ext>
             </a:extLst>
           </p:spPr>
@@ -15492,7 +15810,7 @@
             </a:ln>
             <a:extLst>
               <a:ext uri="{C572A759-6A51-4108-AA02-DFA0A04FC94B}">
-                <ma14:wrappingTextBoxFlag xmlns:ma14="http://schemas.microsoft.com/office/mac/drawingml/2011/main" xmlns="" val="1"/>
+                <ma14:wrappingTextBoxFlag xmlns="" xmlns:ma14="http://schemas.microsoft.com/office/mac/drawingml/2011/main" val="1"/>
               </a:ext>
             </a:extLst>
           </p:spPr>
@@ -21645,21 +21963,6 @@
 </file>
 
 <file path=customXml/item1.xml><?xml version="1.0" encoding="utf-8"?>
-<?mso-contentType ?>
-<FormTemplates xmlns="http://schemas.microsoft.com/sharepoint/v3/contenttype/forms">
-  <Display>DocumentLibraryForm</Display>
-  <Edit>DocumentLibraryForm</Edit>
-  <New>DocumentLibraryForm</New>
-</FormTemplates>
-</file>
-
-<file path=customXml/item2.xml><?xml version="1.0" encoding="utf-8"?>
-<p:properties xmlns:p="http://schemas.microsoft.com/office/2006/metadata/properties" xmlns:xsi="http://www.w3.org/2001/XMLSchema-instance" xmlns:pc="http://schemas.microsoft.com/office/infopath/2007/PartnerControls">
-  <documentManagement/>
-</p:properties>
-</file>
-
-<file path=customXml/item3.xml><?xml version="1.0" encoding="utf-8"?>
 <ct:contentTypeSchema xmlns:ct="http://schemas.microsoft.com/office/2006/metadata/contentType" xmlns:ma="http://schemas.microsoft.com/office/2006/metadata/properties/metaAttributes" ct:_="" ma:_="" ma:contentTypeName="Document" ma:contentTypeID="0x010100DC7AE339B7882D448F35BDC8DA9F6EF2" ma:contentTypeVersion="2" ma:contentTypeDescription="Crée un document." ma:contentTypeScope="" ma:versionID="15d29cb1ab251104f0a626d9a79228f5">
   <xsd:schema xmlns:xsd="http://www.w3.org/2001/XMLSchema" xmlns:xs="http://www.w3.org/2001/XMLSchema" xmlns:p="http://schemas.microsoft.com/office/2006/metadata/properties" xmlns:ns2="6bbf22c1-136e-41b0-a9c4-08dc8f513aff" targetNamespace="http://schemas.microsoft.com/office/2006/metadata/properties" ma:root="true" ma:fieldsID="1402245cf9aa1487a3cafad72beaf1fa" ns2:_="">
     <xsd:import namespace="6bbf22c1-136e-41b0-a9c4-08dc8f513aff"/>
@@ -21791,24 +22094,22 @@
 </ct:contentTypeSchema>
 </file>
 
-<file path=customXml/itemProps1.xml><?xml version="1.0" encoding="utf-8"?>
-<ds:datastoreItem xmlns:ds="http://schemas.openxmlformats.org/officeDocument/2006/customXml" ds:itemID="{BC8C9CD7-EE5A-4140-B442-40EE72C1F6EC}">
-  <ds:schemaRefs>
-    <ds:schemaRef ds:uri="http://schemas.microsoft.com/sharepoint/v3/contenttype/forms"/>
-  </ds:schemaRefs>
-</ds:datastoreItem>
+<file path=customXml/item2.xml><?xml version="1.0" encoding="utf-8"?>
+<p:properties xmlns:p="http://schemas.microsoft.com/office/2006/metadata/properties" xmlns:xsi="http://www.w3.org/2001/XMLSchema-instance" xmlns:pc="http://schemas.microsoft.com/office/infopath/2007/PartnerControls">
+  <documentManagement/>
+</p:properties>
 </file>
 
-<file path=customXml/itemProps2.xml><?xml version="1.0" encoding="utf-8"?>
-<ds:datastoreItem xmlns:ds="http://schemas.openxmlformats.org/officeDocument/2006/customXml" ds:itemID="{0001510D-5DFD-4629-A048-3AFBCCD54C07}">
-  <ds:schemaRefs>
-    <ds:schemaRef ds:uri="http://schemas.microsoft.com/office/2006/metadata/properties"/>
-    <ds:schemaRef ds:uri="http://schemas.microsoft.com/office/infopath/2007/PartnerControls"/>
-  </ds:schemaRefs>
-</ds:datastoreItem>
+<file path=customXml/item3.xml><?xml version="1.0" encoding="utf-8"?>
+<?mso-contentType ?>
+<FormTemplates xmlns="http://schemas.microsoft.com/sharepoint/v3/contenttype/forms">
+  <Display>DocumentLibraryForm</Display>
+  <Edit>DocumentLibraryForm</Edit>
+  <New>DocumentLibraryForm</New>
+</FormTemplates>
 </file>
 
-<file path=customXml/itemProps3.xml><?xml version="1.0" encoding="utf-8"?>
+<file path=customXml/itemProps1.xml><?xml version="1.0" encoding="utf-8"?>
 <ds:datastoreItem xmlns:ds="http://schemas.openxmlformats.org/officeDocument/2006/customXml" ds:itemID="{4B9A97CE-4A02-4A98-852D-AD0750310279}">
   <ds:schemaRefs>
     <ds:schemaRef ds:uri="http://schemas.microsoft.com/office/2006/metadata/contentType"/>
@@ -21824,4 +22125,21 @@
     <ds:schemaRef ds:uri="http://schemas.microsoft.com/internal/obd"/>
   </ds:schemaRefs>
 </ds:datastoreItem>
+</file>
+
+<file path=customXml/itemProps2.xml><?xml version="1.0" encoding="utf-8"?>
+<ds:datastoreItem xmlns:ds="http://schemas.openxmlformats.org/officeDocument/2006/customXml" ds:itemID="{0001510D-5DFD-4629-A048-3AFBCCD54C07}">
+  <ds:schemaRefs>
+    <ds:schemaRef ds:uri="http://schemas.microsoft.com/office/2006/metadata/properties"/>
+    <ds:schemaRef ds:uri="http://schemas.microsoft.com/office/infopath/2007/PartnerControls"/>
+  </ds:schemaRefs>
+</ds:datastoreItem>
+</file>
+
+<file path=customXml/itemProps3.xml><?xml version="1.0" encoding="utf-8"?>
+<ds:datastoreItem xmlns:ds="http://schemas.openxmlformats.org/officeDocument/2006/customXml" ds:itemID="{BC8C9CD7-EE5A-4140-B442-40EE72C1F6EC}">
+  <ds:schemaRefs>
+    <ds:schemaRef ds:uri="http://schemas.microsoft.com/sharepoint/v3/contenttype/forms"/>
+  </ds:schemaRefs>
+</ds:datastoreItem>
 </file>
</xml_diff>

<commit_message>
doc - update requirements according to our progress
</commit_message>
<xml_diff>
--- a/20201202_AndroidFilaire_ProjectRequirements.pptx
+++ b/20201202_AndroidFilaire_ProjectRequirements.pptx
@@ -1393,7 +1393,7 @@
           <a:p>
             <a:fld id="{0E138098-C4A3-4BCA-89EB-E40766D4218F}" type="datetimeFigureOut">
               <a:rPr lang="en-US" smtClean="0"/>
-              <a:t>12/10/2020</a:t>
+              <a:t>12/17/2020</a:t>
             </a:fld>
             <a:endParaRPr lang="en-US"/>
           </a:p>
@@ -9720,7 +9720,7 @@
         <p:spPr/>
         <p:txBody>
           <a:bodyPr>
-            <a:normAutofit fontScale="92500" lnSpcReduction="10000"/>
+            <a:normAutofit fontScale="92500" lnSpcReduction="20000"/>
           </a:bodyPr>
           <a:lstStyle/>
           <a:p>
@@ -9859,6 +9859,109 @@
             <a:r>
               <a:rPr lang="fr-FR" u="sng" dirty="0"/>
               <a:t> USB Android API</a:t>
+            </a:r>
+          </a:p>
+          <a:p>
+            <a:pPr lvl="1"/>
+            <a:r>
+              <a:rPr lang="fr-FR" dirty="0"/>
+              <a:t>(16/12/2020) </a:t>
+            </a:r>
+            <a:r>
+              <a:rPr lang="fr-FR" dirty="0" err="1"/>
+              <a:t>We</a:t>
+            </a:r>
+            <a:r>
+              <a:rPr lang="fr-FR" dirty="0"/>
+              <a:t> </a:t>
+            </a:r>
+            <a:r>
+              <a:rPr lang="fr-FR" dirty="0" err="1"/>
+              <a:t>did</a:t>
+            </a:r>
+            <a:r>
+              <a:rPr lang="fr-FR" dirty="0"/>
+              <a:t> a Proxy socket Server, </a:t>
+            </a:r>
+            <a:r>
+              <a:rPr lang="fr-FR" dirty="0" err="1"/>
+              <a:t>it</a:t>
+            </a:r>
+            <a:r>
+              <a:rPr lang="fr-FR" dirty="0"/>
+              <a:t> services the </a:t>
+            </a:r>
+            <a:r>
+              <a:rPr lang="fr-FR" dirty="0" err="1"/>
+              <a:t>dlLL</a:t>
+            </a:r>
+            <a:r>
+              <a:rPr lang="fr-FR" dirty="0"/>
+              <a:t> </a:t>
+            </a:r>
+            <a:r>
+              <a:rPr lang="fr-FR" dirty="0" err="1"/>
+              <a:t>request</a:t>
+            </a:r>
+            <a:endParaRPr lang="fr-FR" dirty="0"/>
+          </a:p>
+          <a:p>
+            <a:pPr lvl="1"/>
+            <a:r>
+              <a:rPr lang="fr-FR" dirty="0" err="1"/>
+              <a:t>We</a:t>
+            </a:r>
+            <a:r>
+              <a:rPr lang="fr-FR" dirty="0"/>
+              <a:t> manager to </a:t>
+            </a:r>
+            <a:r>
+              <a:rPr lang="fr-FR" dirty="0" err="1"/>
+              <a:t>write</a:t>
+            </a:r>
+            <a:r>
+              <a:rPr lang="fr-FR" dirty="0"/>
+              <a:t> to the </a:t>
+            </a:r>
+            <a:r>
+              <a:rPr lang="fr-FR" dirty="0" err="1"/>
+              <a:t>device</a:t>
+            </a:r>
+            <a:r>
+              <a:rPr lang="fr-FR" dirty="0"/>
+              <a:t> </a:t>
+            </a:r>
+            <a:r>
+              <a:rPr lang="fr-FR" dirty="0" err="1"/>
+              <a:t>using</a:t>
+            </a:r>
+            <a:r>
+              <a:rPr lang="fr-FR" dirty="0"/>
+              <a:t> a </a:t>
+            </a:r>
+            <a:r>
+              <a:rPr lang="fr-FR" dirty="0" err="1"/>
+              <a:t>modified</a:t>
+            </a:r>
+            <a:r>
+              <a:rPr lang="fr-FR" dirty="0"/>
+              <a:t> </a:t>
+            </a:r>
+            <a:r>
+              <a:rPr lang="fr-FR" dirty="0" err="1"/>
+              <a:t>libusb</a:t>
+            </a:r>
+            <a:r>
+              <a:rPr lang="fr-FR" dirty="0"/>
+              <a:t> (</a:t>
+            </a:r>
+            <a:r>
+              <a:rPr lang="fr-FR" dirty="0" err="1"/>
+              <a:t>read</a:t>
+            </a:r>
+            <a:r>
+              <a:rPr lang="fr-FR" dirty="0"/>
+              <a:t> fail)</a:t>
             </a:r>
           </a:p>
           <a:p>
@@ -10175,7 +10278,9 @@
         </p:nvSpPr>
         <p:spPr/>
         <p:txBody>
-          <a:bodyPr/>
+          <a:bodyPr>
+            <a:normAutofit fontScale="85000" lnSpcReduction="20000"/>
+          </a:bodyPr>
           <a:lstStyle/>
           <a:p>
             <a:r>
@@ -10240,8 +10345,13 @@
             </a:r>
             <a:r>
               <a:rPr lang="fr-FR" dirty="0"/>
-              <a:t> (ENOENT)</a:t>
-            </a:r>
+              <a:t> (ENOENT for </a:t>
+            </a:r>
+            <a:r>
+              <a:rPr lang="fr-FR" dirty="0" err="1"/>
+              <a:t>Writesà</a:t>
+            </a:r>
+            <a:endParaRPr lang="fr-FR" dirty="0"/>
           </a:p>
           <a:p>
             <a:r>
@@ -10465,6 +10575,89 @@
             </a:r>
           </a:p>
           <a:p>
+            <a:pPr lvl="2"/>
+            <a:r>
+              <a:rPr lang="en-US" dirty="0">
+                <a:solidFill>
+                  <a:srgbClr val="45F786"/>
+                </a:solidFill>
+              </a:rPr>
+              <a:t>Debug the </a:t>
+            </a:r>
+            <a:r>
+              <a:rPr lang="en-US" dirty="0" err="1">
+                <a:solidFill>
+                  <a:srgbClr val="45F786"/>
+                </a:solidFill>
+              </a:rPr>
+              <a:t>usbdev</a:t>
+            </a:r>
+            <a:r>
+              <a:rPr lang="en-US" dirty="0">
+                <a:solidFill>
+                  <a:srgbClr val="45F786"/>
+                </a:solidFill>
+              </a:rPr>
+              <a:t> device</a:t>
+            </a:r>
+          </a:p>
+          <a:p>
+            <a:pPr lvl="2"/>
+            <a:r>
+              <a:rPr lang="fr-FR" dirty="0" err="1">
+                <a:solidFill>
+                  <a:srgbClr val="45F786"/>
+                </a:solidFill>
+              </a:rPr>
+              <a:t>Debug</a:t>
+            </a:r>
+            <a:r>
+              <a:rPr lang="fr-FR" dirty="0">
+                <a:solidFill>
+                  <a:srgbClr val="45F786"/>
+                </a:solidFill>
+              </a:rPr>
+              <a:t> the </a:t>
+            </a:r>
+            <a:r>
+              <a:rPr lang="fr-FR" dirty="0" err="1">
+                <a:solidFill>
+                  <a:srgbClr val="45F786"/>
+                </a:solidFill>
+              </a:rPr>
+              <a:t>libub</a:t>
+            </a:r>
+            <a:r>
+              <a:rPr lang="fr-FR" dirty="0">
+                <a:solidFill>
+                  <a:srgbClr val="45F786"/>
+                </a:solidFill>
+              </a:rPr>
+              <a:t> </a:t>
+            </a:r>
+            <a:r>
+              <a:rPr lang="fr-FR" dirty="0" err="1">
+                <a:solidFill>
+                  <a:srgbClr val="45F786"/>
+                </a:solidFill>
+              </a:rPr>
+              <a:t>device</a:t>
+            </a:r>
+            <a:r>
+              <a:rPr lang="fr-FR">
+                <a:solidFill>
+                  <a:srgbClr val="45F786"/>
+                </a:solidFill>
+              </a:rPr>
+              <a:t>.</a:t>
+            </a:r>
+            <a:endParaRPr lang="fr-FR" dirty="0">
+              <a:solidFill>
+                <a:srgbClr val="45F786"/>
+              </a:solidFill>
+            </a:endParaRPr>
+          </a:p>
+          <a:p>
             <a:pPr lvl="1"/>
             <a:r>
               <a:rPr lang="fr-FR" dirty="0"/>
@@ -10478,6 +10671,9 @@
               <a:rPr lang="fr-FR" dirty="0"/>
               <a:t> : </a:t>
             </a:r>
+          </a:p>
+          <a:p>
+            <a:pPr lvl="2"/>
             <a:r>
               <a:rPr lang="fr-FR" dirty="0" err="1"/>
               <a:t>implement</a:t>
@@ -10583,7 +10779,7 @@
               <a:t>work</a:t>
             </a:r>
             <a:r>
-              <a:rPr lang="fr-FR" u="sng">
+              <a:rPr lang="fr-FR" u="sng" dirty="0">
                 <a:sym typeface="Wingdings" panose="05000000000000000000" pitchFamily="2" charset="2"/>
               </a:rPr>
               <a:t> and </a:t>
@@ -10654,6 +10850,96 @@
               </a:rPr>
               <a:t>.</a:t>
             </a:r>
+          </a:p>
+          <a:p>
+            <a:pPr lvl="2"/>
+            <a:r>
+              <a:rPr lang="fr-FR" dirty="0" err="1">
+                <a:sym typeface="Wingdings" panose="05000000000000000000" pitchFamily="2" charset="2"/>
+              </a:rPr>
+              <a:t>Implement</a:t>
+            </a:r>
+            <a:r>
+              <a:rPr lang="fr-FR" dirty="0">
+                <a:sym typeface="Wingdings" panose="05000000000000000000" pitchFamily="2" charset="2"/>
+              </a:rPr>
+              <a:t> a proxy server on the Android </a:t>
+            </a:r>
+            <a:r>
+              <a:rPr lang="fr-FR" dirty="0" err="1">
+                <a:sym typeface="Wingdings" panose="05000000000000000000" pitchFamily="2" charset="2"/>
+              </a:rPr>
+              <a:t>Side</a:t>
+            </a:r>
+            <a:r>
+              <a:rPr lang="fr-FR" dirty="0">
+                <a:sym typeface="Wingdings" panose="05000000000000000000" pitchFamily="2" charset="2"/>
+              </a:rPr>
+              <a:t> That services USB </a:t>
+            </a:r>
+            <a:r>
+              <a:rPr lang="fr-FR" dirty="0" err="1">
+                <a:sym typeface="Wingdings" panose="05000000000000000000" pitchFamily="2" charset="2"/>
+              </a:rPr>
+              <a:t>request</a:t>
+            </a:r>
+            <a:r>
+              <a:rPr lang="fr-FR" dirty="0">
+                <a:sym typeface="Wingdings" panose="05000000000000000000" pitchFamily="2" charset="2"/>
+              </a:rPr>
+              <a:t>  </a:t>
+            </a:r>
+            <a:r>
+              <a:rPr lang="fr-FR" u="sng" dirty="0" err="1">
+                <a:sym typeface="Wingdings" panose="05000000000000000000" pitchFamily="2" charset="2"/>
+              </a:rPr>
+              <a:t>We</a:t>
+            </a:r>
+            <a:r>
+              <a:rPr lang="fr-FR" u="sng" dirty="0">
+                <a:sym typeface="Wingdings" panose="05000000000000000000" pitchFamily="2" charset="2"/>
+              </a:rPr>
+              <a:t> </a:t>
+            </a:r>
+            <a:r>
+              <a:rPr lang="fr-FR" u="sng" dirty="0" err="1">
+                <a:sym typeface="Wingdings" panose="05000000000000000000" pitchFamily="2" charset="2"/>
+              </a:rPr>
+              <a:t>done</a:t>
+            </a:r>
+            <a:r>
+              <a:rPr lang="fr-FR" u="sng" dirty="0">
+                <a:sym typeface="Wingdings" panose="05000000000000000000" pitchFamily="2" charset="2"/>
+              </a:rPr>
+              <a:t> </a:t>
+            </a:r>
+            <a:r>
+              <a:rPr lang="fr-FR" u="sng" dirty="0" err="1">
+                <a:sym typeface="Wingdings" panose="05000000000000000000" pitchFamily="2" charset="2"/>
+              </a:rPr>
+              <a:t>this</a:t>
+            </a:r>
+            <a:r>
+              <a:rPr lang="fr-FR" u="sng" dirty="0">
+                <a:sym typeface="Wingdings" panose="05000000000000000000" pitchFamily="2" charset="2"/>
+              </a:rPr>
+              <a:t> </a:t>
+            </a:r>
+            <a:r>
+              <a:rPr lang="fr-FR" u="sng" dirty="0" err="1">
+                <a:sym typeface="Wingdings" panose="05000000000000000000" pitchFamily="2" charset="2"/>
+              </a:rPr>
+              <a:t>work</a:t>
+            </a:r>
+            <a:r>
+              <a:rPr lang="fr-FR" u="sng" dirty="0">
+                <a:sym typeface="Wingdings" panose="05000000000000000000" pitchFamily="2" charset="2"/>
+              </a:rPr>
+              <a:t>.</a:t>
+            </a:r>
+          </a:p>
+          <a:p>
+            <a:pPr lvl="1"/>
             <a:endParaRPr lang="fr-FR" dirty="0"/>
           </a:p>
           <a:p>
@@ -10688,7 +10974,18 @@
                   <a:srgbClr val="FF0000"/>
                 </a:solidFill>
               </a:rPr>
-              <a:t> : bypass </a:t>
+              <a:t> : </a:t>
+            </a:r>
+          </a:p>
+          <a:p>
+            <a:pPr lvl="2"/>
+            <a:r>
+              <a:rPr lang="fr-FR" dirty="0">
+                <a:solidFill>
+                  <a:srgbClr val="FF0000"/>
+                </a:solidFill>
+              </a:rPr>
+              <a:t>bypass </a:t>
             </a:r>
             <a:r>
               <a:rPr lang="fr-FR" dirty="0" err="1">
@@ -10736,7 +11033,34 @@
                   <a:srgbClr val="FF0000"/>
                 </a:solidFill>
               </a:rPr>
-              <a:t> in C#</a:t>
+              <a:t> in C#, </a:t>
+            </a:r>
+          </a:p>
+          <a:p>
+            <a:pPr lvl="2"/>
+            <a:r>
+              <a:rPr lang="fr-FR" dirty="0">
+                <a:solidFill>
+                  <a:srgbClr val="FF0000"/>
+                </a:solidFill>
+              </a:rPr>
+              <a:t>root the </a:t>
+            </a:r>
+            <a:r>
+              <a:rPr lang="fr-FR" dirty="0" err="1">
+                <a:solidFill>
+                  <a:srgbClr val="FF0000"/>
+                </a:solidFill>
+              </a:rPr>
+              <a:t>tablet</a:t>
+            </a:r>
+            <a:r>
+              <a:rPr lang="fr-FR" dirty="0">
+                <a:solidFill>
+                  <a:srgbClr val="FF0000"/>
+                </a:solidFill>
+              </a:rPr>
+              <a:t>.</a:t>
             </a:r>
           </a:p>
         </p:txBody>
@@ -13736,7 +14060,7 @@
               </a:ln>
               <a:extLst>
                 <a:ext uri="{C572A759-6A51-4108-AA02-DFA0A04FC94B}">
-                  <ma14:wrappingTextBoxFlag xmlns="" xmlns:ma14="http://schemas.microsoft.com/office/mac/drawingml/2011/main" val="1"/>
+                  <ma14:wrappingTextBoxFlag xmlns:ma14="http://schemas.microsoft.com/office/mac/drawingml/2011/main" xmlns="" val="1"/>
                 </a:ext>
               </a:extLst>
             </p:spPr>
@@ -13848,7 +14172,7 @@
               </a:ln>
               <a:extLst>
                 <a:ext uri="{C572A759-6A51-4108-AA02-DFA0A04FC94B}">
-                  <ma14:wrappingTextBoxFlag xmlns="" xmlns:ma14="http://schemas.microsoft.com/office/mac/drawingml/2011/main" val="1"/>
+                  <ma14:wrappingTextBoxFlag xmlns:ma14="http://schemas.microsoft.com/office/mac/drawingml/2011/main" xmlns="" val="1"/>
                 </a:ext>
               </a:extLst>
             </p:spPr>
@@ -13960,7 +14284,7 @@
               </a:ln>
               <a:extLst>
                 <a:ext uri="{C572A759-6A51-4108-AA02-DFA0A04FC94B}">
-                  <ma14:wrappingTextBoxFlag xmlns="" xmlns:ma14="http://schemas.microsoft.com/office/mac/drawingml/2011/main" val="1"/>
+                  <ma14:wrappingTextBoxFlag xmlns:ma14="http://schemas.microsoft.com/office/mac/drawingml/2011/main" xmlns="" val="1"/>
                 </a:ext>
               </a:extLst>
             </p:spPr>
@@ -14072,7 +14396,7 @@
               </a:ln>
               <a:extLst>
                 <a:ext uri="{C572A759-6A51-4108-AA02-DFA0A04FC94B}">
-                  <ma14:wrappingTextBoxFlag xmlns="" xmlns:ma14="http://schemas.microsoft.com/office/mac/drawingml/2011/main" val="1"/>
+                  <ma14:wrappingTextBoxFlag xmlns:ma14="http://schemas.microsoft.com/office/mac/drawingml/2011/main" xmlns="" val="1"/>
                 </a:ext>
               </a:extLst>
             </p:spPr>
@@ -14184,7 +14508,7 @@
               </a:ln>
               <a:extLst>
                 <a:ext uri="{C572A759-6A51-4108-AA02-DFA0A04FC94B}">
-                  <ma14:wrappingTextBoxFlag xmlns="" xmlns:ma14="http://schemas.microsoft.com/office/mac/drawingml/2011/main" val="1"/>
+                  <ma14:wrappingTextBoxFlag xmlns:ma14="http://schemas.microsoft.com/office/mac/drawingml/2011/main" xmlns="" val="1"/>
                 </a:ext>
               </a:extLst>
             </p:spPr>
@@ -14296,7 +14620,7 @@
               </a:ln>
               <a:extLst>
                 <a:ext uri="{C572A759-6A51-4108-AA02-DFA0A04FC94B}">
-                  <ma14:wrappingTextBoxFlag xmlns="" xmlns:ma14="http://schemas.microsoft.com/office/mac/drawingml/2011/main" val="1"/>
+                  <ma14:wrappingTextBoxFlag xmlns:ma14="http://schemas.microsoft.com/office/mac/drawingml/2011/main" xmlns="" val="1"/>
                 </a:ext>
               </a:extLst>
             </p:spPr>
@@ -14414,7 +14738,7 @@
               </a:ln>
               <a:extLst>
                 <a:ext uri="{C572A759-6A51-4108-AA02-DFA0A04FC94B}">
-                  <ma14:wrappingTextBoxFlag xmlns="" xmlns:ma14="http://schemas.microsoft.com/office/mac/drawingml/2011/main" val="1"/>
+                  <ma14:wrappingTextBoxFlag xmlns:ma14="http://schemas.microsoft.com/office/mac/drawingml/2011/main" xmlns="" val="1"/>
                 </a:ext>
               </a:extLst>
             </p:spPr>
@@ -14561,7 +14885,7 @@
               </a:ln>
               <a:extLst>
                 <a:ext uri="{C572A759-6A51-4108-AA02-DFA0A04FC94B}">
-                  <ma14:wrappingTextBoxFlag xmlns="" xmlns:ma14="http://schemas.microsoft.com/office/mac/drawingml/2011/main" val="1"/>
+                  <ma14:wrappingTextBoxFlag xmlns:ma14="http://schemas.microsoft.com/office/mac/drawingml/2011/main" xmlns="" val="1"/>
                 </a:ext>
               </a:extLst>
             </p:spPr>
@@ -14699,7 +15023,7 @@
               </a:ln>
               <a:extLst>
                 <a:ext uri="{C572A759-6A51-4108-AA02-DFA0A04FC94B}">
-                  <ma14:wrappingTextBoxFlag xmlns="" xmlns:ma14="http://schemas.microsoft.com/office/mac/drawingml/2011/main" val="1"/>
+                  <ma14:wrappingTextBoxFlag xmlns:ma14="http://schemas.microsoft.com/office/mac/drawingml/2011/main" xmlns="" val="1"/>
                 </a:ext>
               </a:extLst>
             </p:spPr>
@@ -14820,7 +15144,7 @@
               </a:ln>
               <a:extLst>
                 <a:ext uri="{C572A759-6A51-4108-AA02-DFA0A04FC94B}">
-                  <ma14:wrappingTextBoxFlag xmlns="" xmlns:ma14="http://schemas.microsoft.com/office/mac/drawingml/2011/main" val="1"/>
+                  <ma14:wrappingTextBoxFlag xmlns:ma14="http://schemas.microsoft.com/office/mac/drawingml/2011/main" xmlns="" val="1"/>
                 </a:ext>
               </a:extLst>
             </p:spPr>
@@ -14968,7 +15292,7 @@
             </a:ln>
             <a:extLst>
               <a:ext uri="{C572A759-6A51-4108-AA02-DFA0A04FC94B}">
-                <ma14:wrappingTextBoxFlag xmlns="" xmlns:ma14="http://schemas.microsoft.com/office/mac/drawingml/2011/main" val="1"/>
+                <ma14:wrappingTextBoxFlag xmlns:ma14="http://schemas.microsoft.com/office/mac/drawingml/2011/main" xmlns="" val="1"/>
               </a:ext>
             </a:extLst>
           </p:spPr>
@@ -15080,7 +15404,7 @@
             </a:ln>
             <a:extLst>
               <a:ext uri="{C572A759-6A51-4108-AA02-DFA0A04FC94B}">
-                <ma14:wrappingTextBoxFlag xmlns="" xmlns:ma14="http://schemas.microsoft.com/office/mac/drawingml/2011/main" val="1"/>
+                <ma14:wrappingTextBoxFlag xmlns:ma14="http://schemas.microsoft.com/office/mac/drawingml/2011/main" xmlns="" val="1"/>
               </a:ext>
             </a:extLst>
           </p:spPr>
@@ -15698,7 +16022,7 @@
             </a:ln>
             <a:extLst>
               <a:ext uri="{C572A759-6A51-4108-AA02-DFA0A04FC94B}">
-                <ma14:wrappingTextBoxFlag xmlns="" xmlns:ma14="http://schemas.microsoft.com/office/mac/drawingml/2011/main" val="1"/>
+                <ma14:wrappingTextBoxFlag xmlns:ma14="http://schemas.microsoft.com/office/mac/drawingml/2011/main" xmlns="" val="1"/>
               </a:ext>
             </a:extLst>
           </p:spPr>
@@ -15810,7 +16134,7 @@
             </a:ln>
             <a:extLst>
               <a:ext uri="{C572A759-6A51-4108-AA02-DFA0A04FC94B}">
-                <ma14:wrappingTextBoxFlag xmlns="" xmlns:ma14="http://schemas.microsoft.com/office/mac/drawingml/2011/main" val="1"/>
+                <ma14:wrappingTextBoxFlag xmlns:ma14="http://schemas.microsoft.com/office/mac/drawingml/2011/main" xmlns="" val="1"/>
               </a:ext>
             </a:extLst>
           </p:spPr>
@@ -21963,6 +22287,21 @@
 </file>
 
 <file path=customXml/item1.xml><?xml version="1.0" encoding="utf-8"?>
+<?mso-contentType ?>
+<FormTemplates xmlns="http://schemas.microsoft.com/sharepoint/v3/contenttype/forms">
+  <Display>DocumentLibraryForm</Display>
+  <Edit>DocumentLibraryForm</Edit>
+  <New>DocumentLibraryForm</New>
+</FormTemplates>
+</file>
+
+<file path=customXml/item2.xml><?xml version="1.0" encoding="utf-8"?>
+<p:properties xmlns:p="http://schemas.microsoft.com/office/2006/metadata/properties" xmlns:xsi="http://www.w3.org/2001/XMLSchema-instance" xmlns:pc="http://schemas.microsoft.com/office/infopath/2007/PartnerControls">
+  <documentManagement/>
+</p:properties>
+</file>
+
+<file path=customXml/item3.xml><?xml version="1.0" encoding="utf-8"?>
 <ct:contentTypeSchema xmlns:ct="http://schemas.microsoft.com/office/2006/metadata/contentType" xmlns:ma="http://schemas.microsoft.com/office/2006/metadata/properties/metaAttributes" ct:_="" ma:_="" ma:contentTypeName="Document" ma:contentTypeID="0x010100DC7AE339B7882D448F35BDC8DA9F6EF2" ma:contentTypeVersion="2" ma:contentTypeDescription="Crée un document." ma:contentTypeScope="" ma:versionID="15d29cb1ab251104f0a626d9a79228f5">
   <xsd:schema xmlns:xsd="http://www.w3.org/2001/XMLSchema" xmlns:xs="http://www.w3.org/2001/XMLSchema" xmlns:p="http://schemas.microsoft.com/office/2006/metadata/properties" xmlns:ns2="6bbf22c1-136e-41b0-a9c4-08dc8f513aff" targetNamespace="http://schemas.microsoft.com/office/2006/metadata/properties" ma:root="true" ma:fieldsID="1402245cf9aa1487a3cafad72beaf1fa" ns2:_="">
     <xsd:import namespace="6bbf22c1-136e-41b0-a9c4-08dc8f513aff"/>
@@ -22094,22 +22433,24 @@
 </ct:contentTypeSchema>
 </file>
 
-<file path=customXml/item2.xml><?xml version="1.0" encoding="utf-8"?>
-<p:properties xmlns:p="http://schemas.microsoft.com/office/2006/metadata/properties" xmlns:xsi="http://www.w3.org/2001/XMLSchema-instance" xmlns:pc="http://schemas.microsoft.com/office/infopath/2007/PartnerControls">
-  <documentManagement/>
-</p:properties>
+<file path=customXml/itemProps1.xml><?xml version="1.0" encoding="utf-8"?>
+<ds:datastoreItem xmlns:ds="http://schemas.openxmlformats.org/officeDocument/2006/customXml" ds:itemID="{BC8C9CD7-EE5A-4140-B442-40EE72C1F6EC}">
+  <ds:schemaRefs>
+    <ds:schemaRef ds:uri="http://schemas.microsoft.com/sharepoint/v3/contenttype/forms"/>
+  </ds:schemaRefs>
+</ds:datastoreItem>
 </file>
 
-<file path=customXml/item3.xml><?xml version="1.0" encoding="utf-8"?>
-<?mso-contentType ?>
-<FormTemplates xmlns="http://schemas.microsoft.com/sharepoint/v3/contenttype/forms">
-  <Display>DocumentLibraryForm</Display>
-  <Edit>DocumentLibraryForm</Edit>
-  <New>DocumentLibraryForm</New>
-</FormTemplates>
+<file path=customXml/itemProps2.xml><?xml version="1.0" encoding="utf-8"?>
+<ds:datastoreItem xmlns:ds="http://schemas.openxmlformats.org/officeDocument/2006/customXml" ds:itemID="{0001510D-5DFD-4629-A048-3AFBCCD54C07}">
+  <ds:schemaRefs>
+    <ds:schemaRef ds:uri="http://schemas.microsoft.com/office/2006/metadata/properties"/>
+    <ds:schemaRef ds:uri="http://schemas.microsoft.com/office/infopath/2007/PartnerControls"/>
+  </ds:schemaRefs>
+</ds:datastoreItem>
 </file>
 
-<file path=customXml/itemProps1.xml><?xml version="1.0" encoding="utf-8"?>
+<file path=customXml/itemProps3.xml><?xml version="1.0" encoding="utf-8"?>
 <ds:datastoreItem xmlns:ds="http://schemas.openxmlformats.org/officeDocument/2006/customXml" ds:itemID="{4B9A97CE-4A02-4A98-852D-AD0750310279}">
   <ds:schemaRefs>
     <ds:schemaRef ds:uri="http://schemas.microsoft.com/office/2006/metadata/contentType"/>
@@ -22125,21 +22466,4 @@
     <ds:schemaRef ds:uri="http://schemas.microsoft.com/internal/obd"/>
   </ds:schemaRefs>
 </ds:datastoreItem>
-</file>
-
-<file path=customXml/itemProps2.xml><?xml version="1.0" encoding="utf-8"?>
-<ds:datastoreItem xmlns:ds="http://schemas.openxmlformats.org/officeDocument/2006/customXml" ds:itemID="{0001510D-5DFD-4629-A048-3AFBCCD54C07}">
-  <ds:schemaRefs>
-    <ds:schemaRef ds:uri="http://schemas.microsoft.com/office/2006/metadata/properties"/>
-    <ds:schemaRef ds:uri="http://schemas.microsoft.com/office/infopath/2007/PartnerControls"/>
-  </ds:schemaRefs>
-</ds:datastoreItem>
-</file>
-
-<file path=customXml/itemProps3.xml><?xml version="1.0" encoding="utf-8"?>
-<ds:datastoreItem xmlns:ds="http://schemas.openxmlformats.org/officeDocument/2006/customXml" ds:itemID="{BC8C9CD7-EE5A-4140-B442-40EE72C1F6EC}">
-  <ds:schemaRefs>
-    <ds:schemaRef ds:uri="http://schemas.microsoft.com/sharepoint/v3/contenttype/forms"/>
-  </ds:schemaRefs>
-</ds:datastoreItem>
 </file>
</xml_diff>

<commit_message>
doc - update requirement - objectives completed
</commit_message>
<xml_diff>
--- a/20201202_AndroidFilaire_ProjectRequirements.pptx
+++ b/20201202_AndroidFilaire_ProjectRequirements.pptx
@@ -1393,7 +1393,7 @@
           <a:p>
             <a:fld id="{0E138098-C4A3-4BCA-89EB-E40766D4218F}" type="datetimeFigureOut">
               <a:rPr lang="en-US" smtClean="0"/>
-              <a:t>12/17/2020</a:t>
+              <a:t>12/18/2020</a:t>
             </a:fld>
             <a:endParaRPr lang="en-US"/>
           </a:p>
@@ -9720,12 +9720,71 @@
         <p:spPr/>
         <p:txBody>
           <a:bodyPr>
-            <a:normAutofit fontScale="92500" lnSpcReduction="20000"/>
+            <a:normAutofit fontScale="62500" lnSpcReduction="20000"/>
           </a:bodyPr>
           <a:lstStyle/>
           <a:p>
             <a:r>
               <a:rPr lang="fr-FR" dirty="0"/>
+              <a:t>Library </a:t>
+            </a:r>
+            <a:r>
+              <a:rPr lang="fr-FR" dirty="0" err="1"/>
+              <a:t>Wrapper</a:t>
+            </a:r>
+            <a:r>
+              <a:rPr lang="fr-FR" dirty="0"/>
+              <a:t> : </a:t>
+            </a:r>
+            <a:r>
+              <a:rPr lang="fr-FR" dirty="0" err="1"/>
+              <a:t>completed</a:t>
+            </a:r>
+            <a:r>
+              <a:rPr lang="fr-FR" dirty="0"/>
+              <a:t>.</a:t>
+            </a:r>
+          </a:p>
+          <a:p>
+            <a:r>
+              <a:rPr lang="fr-FR" dirty="0" err="1"/>
+              <a:t>Device</a:t>
+            </a:r>
+            <a:r>
+              <a:rPr lang="fr-FR" dirty="0"/>
+              <a:t> : </a:t>
+            </a:r>
+            <a:r>
+              <a:rPr lang="fr-FR" dirty="0" err="1"/>
+              <a:t>completed</a:t>
+            </a:r>
+            <a:r>
+              <a:rPr lang="fr-FR" dirty="0"/>
+              <a:t>. It </a:t>
+            </a:r>
+            <a:r>
+              <a:rPr lang="fr-FR" dirty="0" err="1"/>
+              <a:t>acts</a:t>
+            </a:r>
+            <a:r>
+              <a:rPr lang="fr-FR" dirty="0"/>
+              <a:t> as a USB </a:t>
+            </a:r>
+            <a:r>
+              <a:rPr lang="fr-FR" dirty="0" err="1"/>
+              <a:t>device</a:t>
+            </a:r>
+            <a:r>
+              <a:rPr lang="fr-FR" dirty="0"/>
+              <a:t>.</a:t>
+            </a:r>
+          </a:p>
+          <a:p>
+            <a:endParaRPr lang="fr-FR" dirty="0"/>
+          </a:p>
+          <a:p>
+            <a:r>
+              <a:rPr lang="fr-FR" dirty="0"/>
               <a:t>Mobile application : </a:t>
             </a:r>
           </a:p>
@@ -9864,10 +9923,6 @@
           <a:p>
             <a:pPr lvl="1"/>
             <a:r>
-              <a:rPr lang="fr-FR" dirty="0"/>
-              <a:t>(16/12/2020) </a:t>
-            </a:r>
-            <a:r>
               <a:rPr lang="fr-FR" dirty="0" err="1"/>
               <a:t>We</a:t>
             </a:r>
@@ -9906,22 +9961,36 @@
             <a:endParaRPr lang="fr-FR" dirty="0"/>
           </a:p>
           <a:p>
+            <a:r>
+              <a:rPr lang="fr-FR" dirty="0"/>
+              <a:t>Library : </a:t>
+            </a:r>
+          </a:p>
+          <a:p>
             <a:pPr lvl="1"/>
             <a:r>
               <a:rPr lang="fr-FR" dirty="0" err="1"/>
-              <a:t>We</a:t>
-            </a:r>
-            <a:r>
-              <a:rPr lang="fr-FR" dirty="0"/>
-              <a:t> manager to </a:t>
+              <a:t>protocol</a:t>
+            </a:r>
+            <a:r>
+              <a:rPr lang="fr-FR" dirty="0"/>
+              <a:t> </a:t>
             </a:r>
             <a:r>
               <a:rPr lang="fr-FR" dirty="0" err="1"/>
-              <a:t>write</a:t>
-            </a:r>
-            <a:r>
-              <a:rPr lang="fr-FR" dirty="0"/>
-              <a:t> to the </a:t>
+              <a:t>implemented</a:t>
+            </a:r>
+            <a:r>
+              <a:rPr lang="fr-FR" dirty="0"/>
+              <a:t>, </a:t>
+            </a:r>
+            <a:r>
+              <a:rPr lang="fr-FR" dirty="0" err="1"/>
+              <a:t>with</a:t>
+            </a:r>
+            <a:r>
+              <a:rPr lang="fr-FR" dirty="0"/>
+              <a:t> a pseudo </a:t>
             </a:r>
             <a:r>
               <a:rPr lang="fr-FR" dirty="0" err="1"/>
@@ -9929,76 +9998,6 @@
             </a:r>
             <a:r>
               <a:rPr lang="fr-FR" dirty="0"/>
-              <a:t> </a:t>
-            </a:r>
-            <a:r>
-              <a:rPr lang="fr-FR" dirty="0" err="1"/>
-              <a:t>using</a:t>
-            </a:r>
-            <a:r>
-              <a:rPr lang="fr-FR" dirty="0"/>
-              <a:t> a </a:t>
-            </a:r>
-            <a:r>
-              <a:rPr lang="fr-FR" dirty="0" err="1"/>
-              <a:t>modified</a:t>
-            </a:r>
-            <a:r>
-              <a:rPr lang="fr-FR" dirty="0"/>
-              <a:t> </a:t>
-            </a:r>
-            <a:r>
-              <a:rPr lang="fr-FR" dirty="0" err="1"/>
-              <a:t>libusb</a:t>
-            </a:r>
-            <a:r>
-              <a:rPr lang="fr-FR" dirty="0"/>
-              <a:t> (</a:t>
-            </a:r>
-            <a:r>
-              <a:rPr lang="fr-FR" dirty="0" err="1"/>
-              <a:t>read</a:t>
-            </a:r>
-            <a:r>
-              <a:rPr lang="fr-FR" dirty="0"/>
-              <a:t> fail)</a:t>
-            </a:r>
-          </a:p>
-          <a:p>
-            <a:r>
-              <a:rPr lang="fr-FR" dirty="0"/>
-              <a:t>Library : </a:t>
-            </a:r>
-            <a:r>
-              <a:rPr lang="fr-FR" dirty="0" err="1"/>
-              <a:t>protocol</a:t>
-            </a:r>
-            <a:r>
-              <a:rPr lang="fr-FR" dirty="0"/>
-              <a:t> </a:t>
-            </a:r>
-            <a:r>
-              <a:rPr lang="fr-FR" dirty="0" err="1"/>
-              <a:t>implemented</a:t>
-            </a:r>
-            <a:r>
-              <a:rPr lang="fr-FR" dirty="0"/>
-              <a:t>, </a:t>
-            </a:r>
-            <a:r>
-              <a:rPr lang="fr-FR" dirty="0" err="1"/>
-              <a:t>with</a:t>
-            </a:r>
-            <a:r>
-              <a:rPr lang="fr-FR" dirty="0"/>
-              <a:t> a pseudo </a:t>
-            </a:r>
-            <a:r>
-              <a:rPr lang="fr-FR" dirty="0" err="1"/>
-              <a:t>device</a:t>
-            </a:r>
-            <a:r>
-              <a:rPr lang="fr-FR" dirty="0"/>
               <a:t> for test </a:t>
             </a:r>
             <a:r>
@@ -10019,21 +10018,46 @@
             </a:r>
           </a:p>
           <a:p>
-            <a:r>
-              <a:rPr lang="fr-FR" dirty="0"/>
-              <a:t>Library </a:t>
+            <a:pPr lvl="1"/>
+            <a:r>
+              <a:rPr lang="fr-FR" dirty="0"/>
+              <a:t>16/12/2020 </a:t>
             </a:r>
             <a:r>
               <a:rPr lang="fr-FR" dirty="0" err="1"/>
-              <a:t>Wrapper</a:t>
-            </a:r>
-            <a:r>
-              <a:rPr lang="fr-FR" dirty="0"/>
-              <a:t> : </a:t>
+              <a:t>we</a:t>
+            </a:r>
+            <a:r>
+              <a:rPr lang="fr-FR" dirty="0"/>
+              <a:t> </a:t>
             </a:r>
             <a:r>
               <a:rPr lang="fr-FR" dirty="0" err="1"/>
-              <a:t>completed</a:t>
+              <a:t>did</a:t>
+            </a:r>
+            <a:r>
+              <a:rPr lang="fr-FR" dirty="0"/>
+              <a:t> a client for </a:t>
+            </a:r>
+            <a:r>
+              <a:rPr lang="fr-FR" dirty="0" err="1"/>
+              <a:t>sending</a:t>
+            </a:r>
+            <a:r>
+              <a:rPr lang="fr-FR" dirty="0"/>
+              <a:t> </a:t>
+            </a:r>
+            <a:r>
+              <a:rPr lang="fr-FR" dirty="0" err="1"/>
+              <a:t>request</a:t>
+            </a:r>
+            <a:r>
+              <a:rPr lang="fr-FR" dirty="0"/>
+              <a:t> to the proxy. </a:t>
+            </a:r>
+            <a:r>
+              <a:rPr lang="fr-FR" dirty="0" err="1"/>
+              <a:t>Working</a:t>
             </a:r>
             <a:r>
               <a:rPr lang="fr-FR" dirty="0"/>
@@ -10041,38 +10065,114 @@
             </a:r>
           </a:p>
           <a:p>
-            <a:r>
-              <a:rPr lang="fr-FR" dirty="0" err="1"/>
-              <a:t>Device</a:t>
-            </a:r>
-            <a:r>
-              <a:rPr lang="fr-FR" dirty="0"/>
-              <a:t> : </a:t>
-            </a:r>
-            <a:r>
-              <a:rPr lang="fr-FR" dirty="0" err="1"/>
-              <a:t>completed</a:t>
-            </a:r>
-            <a:r>
-              <a:rPr lang="fr-FR" dirty="0"/>
-              <a:t>. It </a:t>
-            </a:r>
-            <a:r>
-              <a:rPr lang="fr-FR" dirty="0" err="1"/>
-              <a:t>acts</a:t>
-            </a:r>
-            <a:r>
-              <a:rPr lang="fr-FR" dirty="0"/>
-              <a:t> as a </a:t>
-            </a:r>
-            <a:r>
-              <a:rPr lang="fr-FR" dirty="0" err="1"/>
-              <a:t>device</a:t>
-            </a:r>
-            <a:r>
-              <a:rPr lang="fr-FR" dirty="0"/>
-              <a:t>.</a:t>
-            </a:r>
+            <a:pPr lvl="1"/>
+            <a:r>
+              <a:rPr lang="fr-FR" u="sng" dirty="0">
+                <a:highlight>
+                  <a:srgbClr val="0000FF"/>
+                </a:highlight>
+              </a:rPr>
+              <a:t>17/12/2020 : </a:t>
+            </a:r>
+            <a:r>
+              <a:rPr lang="fr-FR" u="sng" dirty="0" err="1">
+                <a:highlight>
+                  <a:srgbClr val="0000FF"/>
+                </a:highlight>
+              </a:rPr>
+              <a:t>We</a:t>
+            </a:r>
+            <a:r>
+              <a:rPr lang="fr-FR" u="sng" dirty="0">
+                <a:highlight>
+                  <a:srgbClr val="0000FF"/>
+                </a:highlight>
+              </a:rPr>
+              <a:t> </a:t>
+            </a:r>
+            <a:r>
+              <a:rPr lang="fr-FR" u="sng" dirty="0" err="1">
+                <a:highlight>
+                  <a:srgbClr val="0000FF"/>
+                </a:highlight>
+              </a:rPr>
+              <a:t>did</a:t>
+            </a:r>
+            <a:r>
+              <a:rPr lang="fr-FR" u="sng" dirty="0">
+                <a:highlight>
+                  <a:srgbClr val="0000FF"/>
+                </a:highlight>
+              </a:rPr>
+              <a:t> </a:t>
+            </a:r>
+            <a:r>
+              <a:rPr lang="fr-FR" u="sng" dirty="0" err="1">
+                <a:highlight>
+                  <a:srgbClr val="0000FF"/>
+                </a:highlight>
+              </a:rPr>
+              <a:t>it</a:t>
+            </a:r>
+            <a:r>
+              <a:rPr lang="fr-FR" u="sng" dirty="0">
+                <a:highlight>
+                  <a:srgbClr val="0000FF"/>
+                </a:highlight>
+              </a:rPr>
+              <a:t> ! </a:t>
+            </a:r>
+            <a:r>
+              <a:rPr lang="fr-FR" u="sng" dirty="0" err="1">
+                <a:highlight>
+                  <a:srgbClr val="0000FF"/>
+                </a:highlight>
+              </a:rPr>
+              <a:t>With</a:t>
+            </a:r>
+            <a:r>
+              <a:rPr lang="fr-FR" u="sng" dirty="0">
+                <a:highlight>
+                  <a:srgbClr val="0000FF"/>
+                </a:highlight>
+              </a:rPr>
+              <a:t> the official </a:t>
+            </a:r>
+            <a:r>
+              <a:rPr lang="fr-FR" u="sng" dirty="0" err="1">
+                <a:highlight>
+                  <a:srgbClr val="0000FF"/>
+                </a:highlight>
+              </a:rPr>
+              <a:t>libusb</a:t>
+            </a:r>
+            <a:r>
+              <a:rPr lang="fr-FR" u="sng" dirty="0">
+                <a:highlight>
+                  <a:srgbClr val="0000FF"/>
+                </a:highlight>
+              </a:rPr>
+              <a:t> </a:t>
+            </a:r>
+            <a:r>
+              <a:rPr lang="fr-FR" u="sng" dirty="0" err="1">
+                <a:highlight>
+                  <a:srgbClr val="0000FF"/>
+                </a:highlight>
+              </a:rPr>
+              <a:t>embbeded</a:t>
+            </a:r>
+            <a:r>
+              <a:rPr lang="fr-FR" u="sng" dirty="0">
+                <a:highlight>
+                  <a:srgbClr val="0000FF"/>
+                </a:highlight>
+              </a:rPr>
+              <a:t> in the API.</a:t>
+            </a:r>
+          </a:p>
+          <a:p>
+            <a:endParaRPr lang="fr-FR" dirty="0"/>
           </a:p>
           <a:p>
             <a:r>
@@ -10255,8 +10355,13 @@
             </a:r>
             <a:r>
               <a:rPr lang="fr-FR" dirty="0"/>
-              <a:t> ?</a:t>
-            </a:r>
+              <a:t> ? 18/12/2020 – All </a:t>
+            </a:r>
+            <a:r>
+              <a:rPr lang="fr-FR" dirty="0" err="1"/>
+              <a:t>complete</a:t>
+            </a:r>
+            <a:endParaRPr lang="fr-FR" dirty="0"/>
           </a:p>
         </p:txBody>
       </p:sp>
@@ -10345,13 +10450,8 @@
             </a:r>
             <a:r>
               <a:rPr lang="fr-FR" dirty="0"/>
-              <a:t> (ENOENT for </a:t>
-            </a:r>
-            <a:r>
-              <a:rPr lang="fr-FR" dirty="0" err="1"/>
-              <a:t>Writesà</a:t>
-            </a:r>
-            <a:endParaRPr lang="fr-FR" dirty="0"/>
+              <a:t> (ENOENT) </a:t>
+            </a:r>
           </a:p>
           <a:p>
             <a:r>
@@ -10577,7 +10677,7 @@
           <a:p>
             <a:pPr lvl="2"/>
             <a:r>
-              <a:rPr lang="en-US" dirty="0">
+              <a:rPr lang="en-US" strike="sngStrike" dirty="0">
                 <a:solidFill>
                   <a:srgbClr val="45F786"/>
                 </a:solidFill>
@@ -10585,7 +10685,7 @@
               <a:t>Debug the </a:t>
             </a:r>
             <a:r>
-              <a:rPr lang="en-US" dirty="0" err="1">
+              <a:rPr lang="en-US" strike="sngStrike" dirty="0" err="1">
                 <a:solidFill>
                   <a:srgbClr val="45F786"/>
                 </a:solidFill>
@@ -10593,7 +10693,7 @@
               <a:t>usbdev</a:t>
             </a:r>
             <a:r>
-              <a:rPr lang="en-US" dirty="0">
+              <a:rPr lang="en-US" strike="sngStrike" dirty="0">
                 <a:solidFill>
                   <a:srgbClr val="45F786"/>
                 </a:solidFill>
@@ -10644,18 +10744,13 @@
               <a:t>device</a:t>
             </a:r>
             <a:r>
-              <a:rPr lang="fr-FR">
+              <a:rPr lang="fr-FR" dirty="0">
                 <a:solidFill>
                   <a:srgbClr val="45F786"/>
                 </a:solidFill>
               </a:rPr>
-              <a:t>.</a:t>
-            </a:r>
-            <a:endParaRPr lang="fr-FR" dirty="0">
-              <a:solidFill>
-                <a:srgbClr val="45F786"/>
-              </a:solidFill>
-            </a:endParaRPr>
+              <a:t> : 18/12/2020 FIXED !</a:t>
+            </a:r>
           </a:p>
           <a:p>
             <a:pPr lvl="1"/>
@@ -14060,7 +14155,7 @@
               </a:ln>
               <a:extLst>
                 <a:ext uri="{C572A759-6A51-4108-AA02-DFA0A04FC94B}">
-                  <ma14:wrappingTextBoxFlag xmlns:ma14="http://schemas.microsoft.com/office/mac/drawingml/2011/main" xmlns="" val="1"/>
+                  <ma14:wrappingTextBoxFlag xmlns="" xmlns:ma14="http://schemas.microsoft.com/office/mac/drawingml/2011/main" val="1"/>
                 </a:ext>
               </a:extLst>
             </p:spPr>
@@ -14172,7 +14267,7 @@
               </a:ln>
               <a:extLst>
                 <a:ext uri="{C572A759-6A51-4108-AA02-DFA0A04FC94B}">
-                  <ma14:wrappingTextBoxFlag xmlns:ma14="http://schemas.microsoft.com/office/mac/drawingml/2011/main" xmlns="" val="1"/>
+                  <ma14:wrappingTextBoxFlag xmlns="" xmlns:ma14="http://schemas.microsoft.com/office/mac/drawingml/2011/main" val="1"/>
                 </a:ext>
               </a:extLst>
             </p:spPr>
@@ -14284,7 +14379,7 @@
               </a:ln>
               <a:extLst>
                 <a:ext uri="{C572A759-6A51-4108-AA02-DFA0A04FC94B}">
-                  <ma14:wrappingTextBoxFlag xmlns:ma14="http://schemas.microsoft.com/office/mac/drawingml/2011/main" xmlns="" val="1"/>
+                  <ma14:wrappingTextBoxFlag xmlns="" xmlns:ma14="http://schemas.microsoft.com/office/mac/drawingml/2011/main" val="1"/>
                 </a:ext>
               </a:extLst>
             </p:spPr>
@@ -14396,7 +14491,7 @@
               </a:ln>
               <a:extLst>
                 <a:ext uri="{C572A759-6A51-4108-AA02-DFA0A04FC94B}">
-                  <ma14:wrappingTextBoxFlag xmlns:ma14="http://schemas.microsoft.com/office/mac/drawingml/2011/main" xmlns="" val="1"/>
+                  <ma14:wrappingTextBoxFlag xmlns="" xmlns:ma14="http://schemas.microsoft.com/office/mac/drawingml/2011/main" val="1"/>
                 </a:ext>
               </a:extLst>
             </p:spPr>
@@ -14508,7 +14603,7 @@
               </a:ln>
               <a:extLst>
                 <a:ext uri="{C572A759-6A51-4108-AA02-DFA0A04FC94B}">
-                  <ma14:wrappingTextBoxFlag xmlns:ma14="http://schemas.microsoft.com/office/mac/drawingml/2011/main" xmlns="" val="1"/>
+                  <ma14:wrappingTextBoxFlag xmlns="" xmlns:ma14="http://schemas.microsoft.com/office/mac/drawingml/2011/main" val="1"/>
                 </a:ext>
               </a:extLst>
             </p:spPr>
@@ -14620,7 +14715,7 @@
               </a:ln>
               <a:extLst>
                 <a:ext uri="{C572A759-6A51-4108-AA02-DFA0A04FC94B}">
-                  <ma14:wrappingTextBoxFlag xmlns:ma14="http://schemas.microsoft.com/office/mac/drawingml/2011/main" xmlns="" val="1"/>
+                  <ma14:wrappingTextBoxFlag xmlns="" xmlns:ma14="http://schemas.microsoft.com/office/mac/drawingml/2011/main" val="1"/>
                 </a:ext>
               </a:extLst>
             </p:spPr>
@@ -14738,7 +14833,7 @@
               </a:ln>
               <a:extLst>
                 <a:ext uri="{C572A759-6A51-4108-AA02-DFA0A04FC94B}">
-                  <ma14:wrappingTextBoxFlag xmlns:ma14="http://schemas.microsoft.com/office/mac/drawingml/2011/main" xmlns="" val="1"/>
+                  <ma14:wrappingTextBoxFlag xmlns="" xmlns:ma14="http://schemas.microsoft.com/office/mac/drawingml/2011/main" val="1"/>
                 </a:ext>
               </a:extLst>
             </p:spPr>
@@ -14885,7 +14980,7 @@
               </a:ln>
               <a:extLst>
                 <a:ext uri="{C572A759-6A51-4108-AA02-DFA0A04FC94B}">
-                  <ma14:wrappingTextBoxFlag xmlns:ma14="http://schemas.microsoft.com/office/mac/drawingml/2011/main" xmlns="" val="1"/>
+                  <ma14:wrappingTextBoxFlag xmlns="" xmlns:ma14="http://schemas.microsoft.com/office/mac/drawingml/2011/main" val="1"/>
                 </a:ext>
               </a:extLst>
             </p:spPr>
@@ -15023,7 +15118,7 @@
               </a:ln>
               <a:extLst>
                 <a:ext uri="{C572A759-6A51-4108-AA02-DFA0A04FC94B}">
-                  <ma14:wrappingTextBoxFlag xmlns:ma14="http://schemas.microsoft.com/office/mac/drawingml/2011/main" xmlns="" val="1"/>
+                  <ma14:wrappingTextBoxFlag xmlns="" xmlns:ma14="http://schemas.microsoft.com/office/mac/drawingml/2011/main" val="1"/>
                 </a:ext>
               </a:extLst>
             </p:spPr>
@@ -15144,7 +15239,7 @@
               </a:ln>
               <a:extLst>
                 <a:ext uri="{C572A759-6A51-4108-AA02-DFA0A04FC94B}">
-                  <ma14:wrappingTextBoxFlag xmlns:ma14="http://schemas.microsoft.com/office/mac/drawingml/2011/main" xmlns="" val="1"/>
+                  <ma14:wrappingTextBoxFlag xmlns="" xmlns:ma14="http://schemas.microsoft.com/office/mac/drawingml/2011/main" val="1"/>
                 </a:ext>
               </a:extLst>
             </p:spPr>
@@ -15292,7 +15387,7 @@
             </a:ln>
             <a:extLst>
               <a:ext uri="{C572A759-6A51-4108-AA02-DFA0A04FC94B}">
-                <ma14:wrappingTextBoxFlag xmlns:ma14="http://schemas.microsoft.com/office/mac/drawingml/2011/main" xmlns="" val="1"/>
+                <ma14:wrappingTextBoxFlag xmlns="" xmlns:ma14="http://schemas.microsoft.com/office/mac/drawingml/2011/main" val="1"/>
               </a:ext>
             </a:extLst>
           </p:spPr>
@@ -15404,7 +15499,7 @@
             </a:ln>
             <a:extLst>
               <a:ext uri="{C572A759-6A51-4108-AA02-DFA0A04FC94B}">
-                <ma14:wrappingTextBoxFlag xmlns:ma14="http://schemas.microsoft.com/office/mac/drawingml/2011/main" xmlns="" val="1"/>
+                <ma14:wrappingTextBoxFlag xmlns="" xmlns:ma14="http://schemas.microsoft.com/office/mac/drawingml/2011/main" val="1"/>
               </a:ext>
             </a:extLst>
           </p:spPr>
@@ -16022,7 +16117,7 @@
             </a:ln>
             <a:extLst>
               <a:ext uri="{C572A759-6A51-4108-AA02-DFA0A04FC94B}">
-                <ma14:wrappingTextBoxFlag xmlns:ma14="http://schemas.microsoft.com/office/mac/drawingml/2011/main" xmlns="" val="1"/>
+                <ma14:wrappingTextBoxFlag xmlns="" xmlns:ma14="http://schemas.microsoft.com/office/mac/drawingml/2011/main" val="1"/>
               </a:ext>
             </a:extLst>
           </p:spPr>
@@ -16134,7 +16229,7 @@
             </a:ln>
             <a:extLst>
               <a:ext uri="{C572A759-6A51-4108-AA02-DFA0A04FC94B}">
-                <ma14:wrappingTextBoxFlag xmlns:ma14="http://schemas.microsoft.com/office/mac/drawingml/2011/main" xmlns="" val="1"/>
+                <ma14:wrappingTextBoxFlag xmlns="" xmlns:ma14="http://schemas.microsoft.com/office/mac/drawingml/2011/main" val="1"/>
               </a:ext>
             </a:extLst>
           </p:spPr>
@@ -18472,16 +18567,8 @@
           </a:p>
           <a:p>
             <a:r>
-              <a:rPr lang="fr-FR" dirty="0"/>
-              <a:t>The </a:t>
-            </a:r>
-            <a:r>
-              <a:rPr lang="fr-FR" dirty="0" err="1"/>
-              <a:t>freelancer</a:t>
-            </a:r>
-            <a:r>
-              <a:rPr lang="fr-FR" dirty="0"/>
-              <a:t> must </a:t>
+              <a:rPr lang="fr-FR"/>
+              <a:t>The consultant must </a:t>
             </a:r>
             <a:r>
               <a:rPr lang="fr-FR" dirty="0" err="1"/>
@@ -22287,21 +22374,6 @@
 </file>
 
 <file path=customXml/item1.xml><?xml version="1.0" encoding="utf-8"?>
-<?mso-contentType ?>
-<FormTemplates xmlns="http://schemas.microsoft.com/sharepoint/v3/contenttype/forms">
-  <Display>DocumentLibraryForm</Display>
-  <Edit>DocumentLibraryForm</Edit>
-  <New>DocumentLibraryForm</New>
-</FormTemplates>
-</file>
-
-<file path=customXml/item2.xml><?xml version="1.0" encoding="utf-8"?>
-<p:properties xmlns:p="http://schemas.microsoft.com/office/2006/metadata/properties" xmlns:xsi="http://www.w3.org/2001/XMLSchema-instance" xmlns:pc="http://schemas.microsoft.com/office/infopath/2007/PartnerControls">
-  <documentManagement/>
-</p:properties>
-</file>
-
-<file path=customXml/item3.xml><?xml version="1.0" encoding="utf-8"?>
 <ct:contentTypeSchema xmlns:ct="http://schemas.microsoft.com/office/2006/metadata/contentType" xmlns:ma="http://schemas.microsoft.com/office/2006/metadata/properties/metaAttributes" ct:_="" ma:_="" ma:contentTypeName="Document" ma:contentTypeID="0x010100DC7AE339B7882D448F35BDC8DA9F6EF2" ma:contentTypeVersion="2" ma:contentTypeDescription="Crée un document." ma:contentTypeScope="" ma:versionID="15d29cb1ab251104f0a626d9a79228f5">
   <xsd:schema xmlns:xsd="http://www.w3.org/2001/XMLSchema" xmlns:xs="http://www.w3.org/2001/XMLSchema" xmlns:p="http://schemas.microsoft.com/office/2006/metadata/properties" xmlns:ns2="6bbf22c1-136e-41b0-a9c4-08dc8f513aff" targetNamespace="http://schemas.microsoft.com/office/2006/metadata/properties" ma:root="true" ma:fieldsID="1402245cf9aa1487a3cafad72beaf1fa" ns2:_="">
     <xsd:import namespace="6bbf22c1-136e-41b0-a9c4-08dc8f513aff"/>
@@ -22433,24 +22505,22 @@
 </ct:contentTypeSchema>
 </file>
 
-<file path=customXml/itemProps1.xml><?xml version="1.0" encoding="utf-8"?>
-<ds:datastoreItem xmlns:ds="http://schemas.openxmlformats.org/officeDocument/2006/customXml" ds:itemID="{BC8C9CD7-EE5A-4140-B442-40EE72C1F6EC}">
-  <ds:schemaRefs>
-    <ds:schemaRef ds:uri="http://schemas.microsoft.com/sharepoint/v3/contenttype/forms"/>
-  </ds:schemaRefs>
-</ds:datastoreItem>
+<file path=customXml/item2.xml><?xml version="1.0" encoding="utf-8"?>
+<p:properties xmlns:p="http://schemas.microsoft.com/office/2006/metadata/properties" xmlns:xsi="http://www.w3.org/2001/XMLSchema-instance" xmlns:pc="http://schemas.microsoft.com/office/infopath/2007/PartnerControls">
+  <documentManagement/>
+</p:properties>
 </file>
 
-<file path=customXml/itemProps2.xml><?xml version="1.0" encoding="utf-8"?>
-<ds:datastoreItem xmlns:ds="http://schemas.openxmlformats.org/officeDocument/2006/customXml" ds:itemID="{0001510D-5DFD-4629-A048-3AFBCCD54C07}">
-  <ds:schemaRefs>
-    <ds:schemaRef ds:uri="http://schemas.microsoft.com/office/2006/metadata/properties"/>
-    <ds:schemaRef ds:uri="http://schemas.microsoft.com/office/infopath/2007/PartnerControls"/>
-  </ds:schemaRefs>
-</ds:datastoreItem>
+<file path=customXml/item3.xml><?xml version="1.0" encoding="utf-8"?>
+<?mso-contentType ?>
+<FormTemplates xmlns="http://schemas.microsoft.com/sharepoint/v3/contenttype/forms">
+  <Display>DocumentLibraryForm</Display>
+  <Edit>DocumentLibraryForm</Edit>
+  <New>DocumentLibraryForm</New>
+</FormTemplates>
 </file>
 
-<file path=customXml/itemProps3.xml><?xml version="1.0" encoding="utf-8"?>
+<file path=customXml/itemProps1.xml><?xml version="1.0" encoding="utf-8"?>
 <ds:datastoreItem xmlns:ds="http://schemas.openxmlformats.org/officeDocument/2006/customXml" ds:itemID="{4B9A97CE-4A02-4A98-852D-AD0750310279}">
   <ds:schemaRefs>
     <ds:schemaRef ds:uri="http://schemas.microsoft.com/office/2006/metadata/contentType"/>
@@ -22466,4 +22536,21 @@
     <ds:schemaRef ds:uri="http://schemas.microsoft.com/internal/obd"/>
   </ds:schemaRefs>
 </ds:datastoreItem>
+</file>
+
+<file path=customXml/itemProps2.xml><?xml version="1.0" encoding="utf-8"?>
+<ds:datastoreItem xmlns:ds="http://schemas.openxmlformats.org/officeDocument/2006/customXml" ds:itemID="{0001510D-5DFD-4629-A048-3AFBCCD54C07}">
+  <ds:schemaRefs>
+    <ds:schemaRef ds:uri="http://schemas.microsoft.com/office/2006/metadata/properties"/>
+    <ds:schemaRef ds:uri="http://schemas.microsoft.com/office/infopath/2007/PartnerControls"/>
+  </ds:schemaRefs>
+</ds:datastoreItem>
+</file>
+
+<file path=customXml/itemProps3.xml><?xml version="1.0" encoding="utf-8"?>
+<ds:datastoreItem xmlns:ds="http://schemas.openxmlformats.org/officeDocument/2006/customXml" ds:itemID="{BC8C9CD7-EE5A-4140-B442-40EE72C1F6EC}">
+  <ds:schemaRefs>
+    <ds:schemaRef ds:uri="http://schemas.microsoft.com/sharepoint/v3/contenttype/forms"/>
+  </ds:schemaRefs>
+</ds:datastoreItem>
 </file>
</xml_diff>